<commit_message>
Update paper post 2nd Frontiers' review
</commit_message>
<xml_diff>
--- a/paper/figures/Process.pptx
+++ b/paper/figures/Process.pptx
@@ -6,6 +6,8 @@
   </p:sldMasterIdLst>
   <p:sldIdLst>
     <p:sldId id="256" r:id="rId2"/>
+    <p:sldId id="257" r:id="rId3"/>
+    <p:sldId id="258" r:id="rId4"/>
   </p:sldIdLst>
   <p:sldSz cx="12192000" cy="6858000"/>
   <p:notesSz cx="6858000" cy="9144000"/>
@@ -259,7 +261,7 @@
           <a:p>
             <a:fld id="{9DCCF192-78D0-496B-8BFD-508F63555054}" type="datetimeFigureOut">
               <a:rPr lang="en-US" smtClean="0"/>
-              <a:t>4/23/2020</a:t>
+              <a:t>4/1/2021</a:t>
             </a:fld>
             <a:endParaRPr lang="en-US"/>
           </a:p>
@@ -457,7 +459,7 @@
           <a:p>
             <a:fld id="{9DCCF192-78D0-496B-8BFD-508F63555054}" type="datetimeFigureOut">
               <a:rPr lang="en-US" smtClean="0"/>
-              <a:t>4/23/2020</a:t>
+              <a:t>4/1/2021</a:t>
             </a:fld>
             <a:endParaRPr lang="en-US"/>
           </a:p>
@@ -665,7 +667,7 @@
           <a:p>
             <a:fld id="{9DCCF192-78D0-496B-8BFD-508F63555054}" type="datetimeFigureOut">
               <a:rPr lang="en-US" smtClean="0"/>
-              <a:t>4/23/2020</a:t>
+              <a:t>4/1/2021</a:t>
             </a:fld>
             <a:endParaRPr lang="en-US"/>
           </a:p>
@@ -863,7 +865,7 @@
           <a:p>
             <a:fld id="{9DCCF192-78D0-496B-8BFD-508F63555054}" type="datetimeFigureOut">
               <a:rPr lang="en-US" smtClean="0"/>
-              <a:t>4/23/2020</a:t>
+              <a:t>4/1/2021</a:t>
             </a:fld>
             <a:endParaRPr lang="en-US"/>
           </a:p>
@@ -1138,7 +1140,7 @@
           <a:p>
             <a:fld id="{9DCCF192-78D0-496B-8BFD-508F63555054}" type="datetimeFigureOut">
               <a:rPr lang="en-US" smtClean="0"/>
-              <a:t>4/23/2020</a:t>
+              <a:t>4/1/2021</a:t>
             </a:fld>
             <a:endParaRPr lang="en-US"/>
           </a:p>
@@ -1403,7 +1405,7 @@
           <a:p>
             <a:fld id="{9DCCF192-78D0-496B-8BFD-508F63555054}" type="datetimeFigureOut">
               <a:rPr lang="en-US" smtClean="0"/>
-              <a:t>4/23/2020</a:t>
+              <a:t>4/1/2021</a:t>
             </a:fld>
             <a:endParaRPr lang="en-US"/>
           </a:p>
@@ -1815,7 +1817,7 @@
           <a:p>
             <a:fld id="{9DCCF192-78D0-496B-8BFD-508F63555054}" type="datetimeFigureOut">
               <a:rPr lang="en-US" smtClean="0"/>
-              <a:t>4/23/2020</a:t>
+              <a:t>4/1/2021</a:t>
             </a:fld>
             <a:endParaRPr lang="en-US"/>
           </a:p>
@@ -1956,7 +1958,7 @@
           <a:p>
             <a:fld id="{9DCCF192-78D0-496B-8BFD-508F63555054}" type="datetimeFigureOut">
               <a:rPr lang="en-US" smtClean="0"/>
-              <a:t>4/23/2020</a:t>
+              <a:t>4/1/2021</a:t>
             </a:fld>
             <a:endParaRPr lang="en-US"/>
           </a:p>
@@ -2069,7 +2071,7 @@
           <a:p>
             <a:fld id="{9DCCF192-78D0-496B-8BFD-508F63555054}" type="datetimeFigureOut">
               <a:rPr lang="en-US" smtClean="0"/>
-              <a:t>4/23/2020</a:t>
+              <a:t>4/1/2021</a:t>
             </a:fld>
             <a:endParaRPr lang="en-US"/>
           </a:p>
@@ -2380,7 +2382,7 @@
           <a:p>
             <a:fld id="{9DCCF192-78D0-496B-8BFD-508F63555054}" type="datetimeFigureOut">
               <a:rPr lang="en-US" smtClean="0"/>
-              <a:t>4/23/2020</a:t>
+              <a:t>4/1/2021</a:t>
             </a:fld>
             <a:endParaRPr lang="en-US"/>
           </a:p>
@@ -2668,7 +2670,7 @@
           <a:p>
             <a:fld id="{9DCCF192-78D0-496B-8BFD-508F63555054}" type="datetimeFigureOut">
               <a:rPr lang="en-US" smtClean="0"/>
-              <a:t>4/23/2020</a:t>
+              <a:t>4/1/2021</a:t>
             </a:fld>
             <a:endParaRPr lang="en-US"/>
           </a:p>
@@ -2909,7 +2911,7 @@
           <a:p>
             <a:fld id="{9DCCF192-78D0-496B-8BFD-508F63555054}" type="datetimeFigureOut">
               <a:rPr lang="en-US" smtClean="0"/>
-              <a:t>4/23/2020</a:t>
+              <a:t>4/1/2021</a:t>
             </a:fld>
             <a:endParaRPr lang="en-US"/>
           </a:p>
@@ -4304,6 +4306,4036 @@
 </p:sld>
 </file>
 
+<file path=ppt/slides/slide2.xml><?xml version="1.0" encoding="utf-8"?>
+<p:sld xmlns:a="http://schemas.openxmlformats.org/drawingml/2006/main" xmlns:r="http://schemas.openxmlformats.org/officeDocument/2006/relationships" xmlns:p="http://schemas.openxmlformats.org/presentationml/2006/main">
+  <p:cSld>
+    <p:spTree>
+      <p:nvGrpSpPr>
+        <p:cNvPr id="1" name=""/>
+        <p:cNvGrpSpPr/>
+        <p:nvPr/>
+      </p:nvGrpSpPr>
+      <p:grpSpPr>
+        <a:xfrm>
+          <a:off x="0" y="0"/>
+          <a:ext cx="0" cy="0"/>
+          <a:chOff x="0" y="0"/>
+          <a:chExt cx="0" cy="0"/>
+        </a:xfrm>
+      </p:grpSpPr>
+      <p:sp>
+        <p:nvSpPr>
+          <p:cNvPr id="4" name="Rectangle 3">
+            <a:extLst>
+              <a:ext uri="{FF2B5EF4-FFF2-40B4-BE49-F238E27FC236}">
+                <a16:creationId xmlns:a16="http://schemas.microsoft.com/office/drawing/2014/main" id="{714E4CCC-52A9-4F54-B749-30E35511B605}"/>
+              </a:ext>
+            </a:extLst>
+          </p:cNvPr>
+          <p:cNvSpPr/>
+          <p:nvPr/>
+        </p:nvSpPr>
+        <p:spPr>
+          <a:xfrm>
+            <a:off x="3904247" y="601579"/>
+            <a:ext cx="1221205" cy="216568"/>
+          </a:xfrm>
+          <a:prstGeom prst="rect">
+            <a:avLst/>
+          </a:prstGeom>
+          <a:solidFill>
+            <a:schemeClr val="tx1"/>
+          </a:solidFill>
+          <a:ln>
+            <a:solidFill>
+              <a:schemeClr val="tx1"/>
+            </a:solidFill>
+          </a:ln>
+        </p:spPr>
+        <p:style>
+          <a:lnRef idx="2">
+            <a:schemeClr val="accent1">
+              <a:shade val="50000"/>
+            </a:schemeClr>
+          </a:lnRef>
+          <a:fillRef idx="1">
+            <a:schemeClr val="accent1"/>
+          </a:fillRef>
+          <a:effectRef idx="0">
+            <a:schemeClr val="accent1"/>
+          </a:effectRef>
+          <a:fontRef idx="minor">
+            <a:schemeClr val="lt1"/>
+          </a:fontRef>
+        </p:style>
+        <p:txBody>
+          <a:bodyPr rtlCol="0" anchor="ctr"/>
+          <a:lstStyle/>
+          <a:p>
+            <a:pPr algn="ctr"/>
+            <a:r>
+              <a:rPr lang="en-US" dirty="0">
+                <a:latin typeface="Arial" panose="020B0604020202020204" pitchFamily="34" charset="0"/>
+                <a:cs typeface="Arial" panose="020B0604020202020204" pitchFamily="34" charset="0"/>
+              </a:rPr>
+              <a:t>+</a:t>
+            </a:r>
+          </a:p>
+        </p:txBody>
+      </p:sp>
+      <p:sp>
+        <p:nvSpPr>
+          <p:cNvPr id="5" name="Rectangle 4">
+            <a:extLst>
+              <a:ext uri="{FF2B5EF4-FFF2-40B4-BE49-F238E27FC236}">
+                <a16:creationId xmlns:a16="http://schemas.microsoft.com/office/drawing/2014/main" id="{1EDB7082-4EE7-4302-9DFD-42E8AB77EFE0}"/>
+              </a:ext>
+            </a:extLst>
+          </p:cNvPr>
+          <p:cNvSpPr/>
+          <p:nvPr/>
+        </p:nvSpPr>
+        <p:spPr>
+          <a:xfrm>
+            <a:off x="5193631" y="601579"/>
+            <a:ext cx="1221205" cy="216568"/>
+          </a:xfrm>
+          <a:prstGeom prst="rect">
+            <a:avLst/>
+          </a:prstGeom>
+          <a:solidFill>
+            <a:schemeClr val="tx1"/>
+          </a:solidFill>
+          <a:ln>
+            <a:solidFill>
+              <a:schemeClr val="tx1"/>
+            </a:solidFill>
+          </a:ln>
+        </p:spPr>
+        <p:style>
+          <a:lnRef idx="2">
+            <a:schemeClr val="accent1">
+              <a:shade val="50000"/>
+            </a:schemeClr>
+          </a:lnRef>
+          <a:fillRef idx="1">
+            <a:schemeClr val="accent1"/>
+          </a:fillRef>
+          <a:effectRef idx="0">
+            <a:schemeClr val="accent1"/>
+          </a:effectRef>
+          <a:fontRef idx="minor">
+            <a:schemeClr val="lt1"/>
+          </a:fontRef>
+        </p:style>
+        <p:txBody>
+          <a:bodyPr rtlCol="0" anchor="ctr"/>
+          <a:lstStyle/>
+          <a:p>
+            <a:pPr algn="ctr"/>
+            <a:r>
+              <a:rPr lang="en-US" dirty="0">
+                <a:latin typeface="Arial" panose="020B0604020202020204" pitchFamily="34" charset="0"/>
+                <a:cs typeface="Arial" panose="020B0604020202020204" pitchFamily="34" charset="0"/>
+              </a:rPr>
+              <a:t>-</a:t>
+            </a:r>
+          </a:p>
+        </p:txBody>
+      </p:sp>
+      <p:sp>
+        <p:nvSpPr>
+          <p:cNvPr id="6" name="Rectangle 5">
+            <a:extLst>
+              <a:ext uri="{FF2B5EF4-FFF2-40B4-BE49-F238E27FC236}">
+                <a16:creationId xmlns:a16="http://schemas.microsoft.com/office/drawing/2014/main" id="{721A4F66-F51B-4A6A-88A6-173A8BDC6AD5}"/>
+              </a:ext>
+            </a:extLst>
+          </p:cNvPr>
+          <p:cNvSpPr/>
+          <p:nvPr/>
+        </p:nvSpPr>
+        <p:spPr>
+          <a:xfrm rot="16200000">
+            <a:off x="3185360" y="1320465"/>
+            <a:ext cx="1221205" cy="216568"/>
+          </a:xfrm>
+          <a:prstGeom prst="rect">
+            <a:avLst/>
+          </a:prstGeom>
+          <a:solidFill>
+            <a:schemeClr val="tx1"/>
+          </a:solidFill>
+          <a:ln>
+            <a:solidFill>
+              <a:schemeClr val="tx1"/>
+            </a:solidFill>
+          </a:ln>
+        </p:spPr>
+        <p:style>
+          <a:lnRef idx="2">
+            <a:schemeClr val="accent1">
+              <a:shade val="50000"/>
+            </a:schemeClr>
+          </a:lnRef>
+          <a:fillRef idx="1">
+            <a:schemeClr val="accent1"/>
+          </a:fillRef>
+          <a:effectRef idx="0">
+            <a:schemeClr val="accent1"/>
+          </a:effectRef>
+          <a:fontRef idx="minor">
+            <a:schemeClr val="lt1"/>
+          </a:fontRef>
+        </p:style>
+        <p:txBody>
+          <a:bodyPr rtlCol="0" anchor="ctr"/>
+          <a:lstStyle/>
+          <a:p>
+            <a:pPr algn="ctr"/>
+            <a:r>
+              <a:rPr lang="en-US" dirty="0">
+                <a:latin typeface="Arial" panose="020B0604020202020204" pitchFamily="34" charset="0"/>
+                <a:cs typeface="Arial" panose="020B0604020202020204" pitchFamily="34" charset="0"/>
+              </a:rPr>
+              <a:t>+</a:t>
+            </a:r>
+          </a:p>
+        </p:txBody>
+      </p:sp>
+      <p:sp>
+        <p:nvSpPr>
+          <p:cNvPr id="7" name="Rectangle 6">
+            <a:extLst>
+              <a:ext uri="{FF2B5EF4-FFF2-40B4-BE49-F238E27FC236}">
+                <a16:creationId xmlns:a16="http://schemas.microsoft.com/office/drawing/2014/main" id="{4BB274B6-7C56-4272-8664-7434EC363E7A}"/>
+              </a:ext>
+            </a:extLst>
+          </p:cNvPr>
+          <p:cNvSpPr/>
+          <p:nvPr/>
+        </p:nvSpPr>
+        <p:spPr>
+          <a:xfrm rot="16200000">
+            <a:off x="3185360" y="2606841"/>
+            <a:ext cx="1221205" cy="216568"/>
+          </a:xfrm>
+          <a:prstGeom prst="rect">
+            <a:avLst/>
+          </a:prstGeom>
+          <a:solidFill>
+            <a:schemeClr val="tx1"/>
+          </a:solidFill>
+          <a:ln>
+            <a:solidFill>
+              <a:schemeClr val="tx1"/>
+            </a:solidFill>
+          </a:ln>
+        </p:spPr>
+        <p:style>
+          <a:lnRef idx="2">
+            <a:schemeClr val="accent1">
+              <a:shade val="50000"/>
+            </a:schemeClr>
+          </a:lnRef>
+          <a:fillRef idx="1">
+            <a:schemeClr val="accent1"/>
+          </a:fillRef>
+          <a:effectRef idx="0">
+            <a:schemeClr val="accent1"/>
+          </a:effectRef>
+          <a:fontRef idx="minor">
+            <a:schemeClr val="lt1"/>
+          </a:fontRef>
+        </p:style>
+        <p:txBody>
+          <a:bodyPr rtlCol="0" anchor="ctr"/>
+          <a:lstStyle/>
+          <a:p>
+            <a:pPr algn="ctr"/>
+            <a:r>
+              <a:rPr lang="en-US" dirty="0">
+                <a:latin typeface="Arial" panose="020B0604020202020204" pitchFamily="34" charset="0"/>
+                <a:cs typeface="Arial" panose="020B0604020202020204" pitchFamily="34" charset="0"/>
+              </a:rPr>
+              <a:t>-</a:t>
+            </a:r>
+          </a:p>
+        </p:txBody>
+      </p:sp>
+      <p:sp>
+        <p:nvSpPr>
+          <p:cNvPr id="8" name="Rectangle 7">
+            <a:extLst>
+              <a:ext uri="{FF2B5EF4-FFF2-40B4-BE49-F238E27FC236}">
+                <a16:creationId xmlns:a16="http://schemas.microsoft.com/office/drawing/2014/main" id="{C5960104-E760-4641-974D-1C4F3449AB95}"/>
+              </a:ext>
+            </a:extLst>
+          </p:cNvPr>
+          <p:cNvSpPr/>
+          <p:nvPr/>
+        </p:nvSpPr>
+        <p:spPr>
+          <a:xfrm>
+            <a:off x="3904247" y="385011"/>
+            <a:ext cx="2510590" cy="216568"/>
+          </a:xfrm>
+          <a:prstGeom prst="rect">
+            <a:avLst/>
+          </a:prstGeom>
+          <a:solidFill>
+            <a:schemeClr val="tx1">
+              <a:lumMod val="65000"/>
+              <a:lumOff val="35000"/>
+            </a:schemeClr>
+          </a:solidFill>
+          <a:ln>
+            <a:solidFill>
+              <a:schemeClr val="tx1"/>
+            </a:solidFill>
+          </a:ln>
+        </p:spPr>
+        <p:style>
+          <a:lnRef idx="2">
+            <a:schemeClr val="accent1">
+              <a:shade val="50000"/>
+            </a:schemeClr>
+          </a:lnRef>
+          <a:fillRef idx="1">
+            <a:schemeClr val="accent1"/>
+          </a:fillRef>
+          <a:effectRef idx="0">
+            <a:schemeClr val="accent1"/>
+          </a:effectRef>
+          <a:fontRef idx="minor">
+            <a:schemeClr val="lt1"/>
+          </a:fontRef>
+        </p:style>
+        <p:txBody>
+          <a:bodyPr rtlCol="0" anchor="ctr"/>
+          <a:lstStyle/>
+          <a:p>
+            <a:pPr algn="ctr"/>
+            <a:r>
+              <a:rPr lang="en-US" sz="1600" dirty="0">
+                <a:latin typeface="Arial" panose="020B0604020202020204" pitchFamily="34" charset="0"/>
+                <a:cs typeface="Arial" panose="020B0604020202020204" pitchFamily="34" charset="0"/>
+              </a:rPr>
+              <a:t>qPCR Result</a:t>
+            </a:r>
+          </a:p>
+        </p:txBody>
+      </p:sp>
+      <p:sp>
+        <p:nvSpPr>
+          <p:cNvPr id="9" name="Rectangle 8">
+            <a:extLst>
+              <a:ext uri="{FF2B5EF4-FFF2-40B4-BE49-F238E27FC236}">
+                <a16:creationId xmlns:a16="http://schemas.microsoft.com/office/drawing/2014/main" id="{67D70D3B-A7B5-4B74-99F7-3539135A1C56}"/>
+              </a:ext>
+            </a:extLst>
+          </p:cNvPr>
+          <p:cNvSpPr/>
+          <p:nvPr/>
+        </p:nvSpPr>
+        <p:spPr>
+          <a:xfrm rot="16200000">
+            <a:off x="2324099" y="1965157"/>
+            <a:ext cx="2510590" cy="216568"/>
+          </a:xfrm>
+          <a:prstGeom prst="rect">
+            <a:avLst/>
+          </a:prstGeom>
+          <a:solidFill>
+            <a:schemeClr val="tx1">
+              <a:lumMod val="65000"/>
+              <a:lumOff val="35000"/>
+            </a:schemeClr>
+          </a:solidFill>
+          <a:ln>
+            <a:solidFill>
+              <a:schemeClr val="tx1"/>
+            </a:solidFill>
+          </a:ln>
+        </p:spPr>
+        <p:style>
+          <a:lnRef idx="2">
+            <a:schemeClr val="accent1">
+              <a:shade val="50000"/>
+            </a:schemeClr>
+          </a:lnRef>
+          <a:fillRef idx="1">
+            <a:schemeClr val="accent1"/>
+          </a:fillRef>
+          <a:effectRef idx="0">
+            <a:schemeClr val="accent1"/>
+          </a:effectRef>
+          <a:fontRef idx="minor">
+            <a:schemeClr val="lt1"/>
+          </a:fontRef>
+        </p:style>
+        <p:txBody>
+          <a:bodyPr rtlCol="0" anchor="ctr"/>
+          <a:lstStyle/>
+          <a:p>
+            <a:pPr algn="ctr"/>
+            <a:r>
+              <a:rPr lang="en-US" sz="1600" dirty="0">
+                <a:latin typeface="Arial" panose="020B0604020202020204" pitchFamily="34" charset="0"/>
+                <a:cs typeface="Arial" panose="020B0604020202020204" pitchFamily="34" charset="0"/>
+              </a:rPr>
+              <a:t>RDT Result</a:t>
+            </a:r>
+          </a:p>
+        </p:txBody>
+      </p:sp>
+      <p:sp>
+        <p:nvSpPr>
+          <p:cNvPr id="11" name="Rectangle 10">
+            <a:extLst>
+              <a:ext uri="{FF2B5EF4-FFF2-40B4-BE49-F238E27FC236}">
+                <a16:creationId xmlns:a16="http://schemas.microsoft.com/office/drawing/2014/main" id="{41AB67C9-E603-4D22-B068-6108F3010A7E}"/>
+              </a:ext>
+            </a:extLst>
+          </p:cNvPr>
+          <p:cNvSpPr/>
+          <p:nvPr/>
+        </p:nvSpPr>
+        <p:spPr>
+          <a:xfrm>
+            <a:off x="5193630" y="2104522"/>
+            <a:ext cx="1221205" cy="1221207"/>
+          </a:xfrm>
+          <a:prstGeom prst="rect">
+            <a:avLst/>
+          </a:prstGeom>
+          <a:noFill/>
+          <a:ln>
+            <a:solidFill>
+              <a:schemeClr val="tx1"/>
+            </a:solidFill>
+          </a:ln>
+        </p:spPr>
+        <p:style>
+          <a:lnRef idx="2">
+            <a:schemeClr val="accent1">
+              <a:shade val="50000"/>
+            </a:schemeClr>
+          </a:lnRef>
+          <a:fillRef idx="1">
+            <a:schemeClr val="accent1"/>
+          </a:fillRef>
+          <a:effectRef idx="0">
+            <a:schemeClr val="accent1"/>
+          </a:effectRef>
+          <a:fontRef idx="minor">
+            <a:schemeClr val="lt1"/>
+          </a:fontRef>
+        </p:style>
+        <p:txBody>
+          <a:bodyPr rtlCol="0" anchor="ctr"/>
+          <a:lstStyle/>
+          <a:p>
+            <a:pPr algn="ctr"/>
+            <a:r>
+              <a:rPr lang="en-US" sz="1600" dirty="0">
+                <a:solidFill>
+                  <a:schemeClr val="tx1"/>
+                </a:solidFill>
+                <a:latin typeface="Arial" panose="020B0604020202020204" pitchFamily="34" charset="0"/>
+                <a:cs typeface="Arial" panose="020B0604020202020204" pitchFamily="34" charset="0"/>
+              </a:rPr>
+              <a:t>18</a:t>
+            </a:r>
+          </a:p>
+          <a:p>
+            <a:pPr algn="ctr"/>
+            <a:r>
+              <a:rPr lang="en-US" sz="1100" dirty="0">
+                <a:solidFill>
+                  <a:schemeClr val="tx1"/>
+                </a:solidFill>
+                <a:latin typeface="Arial" panose="020B0604020202020204" pitchFamily="34" charset="0"/>
+                <a:cs typeface="Arial" panose="020B0604020202020204" pitchFamily="34" charset="0"/>
+              </a:rPr>
+              <a:t>True Negatives</a:t>
+            </a:r>
+          </a:p>
+        </p:txBody>
+      </p:sp>
+      <p:sp>
+        <p:nvSpPr>
+          <p:cNvPr id="12" name="Rectangle 11">
+            <a:extLst>
+              <a:ext uri="{FF2B5EF4-FFF2-40B4-BE49-F238E27FC236}">
+                <a16:creationId xmlns:a16="http://schemas.microsoft.com/office/drawing/2014/main" id="{D51D2A7B-780E-4650-855A-7DECFC4B7567}"/>
+              </a:ext>
+            </a:extLst>
+          </p:cNvPr>
+          <p:cNvSpPr/>
+          <p:nvPr/>
+        </p:nvSpPr>
+        <p:spPr>
+          <a:xfrm>
+            <a:off x="3471108" y="385011"/>
+            <a:ext cx="3725135" cy="3717755"/>
+          </a:xfrm>
+          <a:prstGeom prst="rect">
+            <a:avLst/>
+          </a:prstGeom>
+          <a:noFill/>
+          <a:ln>
+            <a:solidFill>
+              <a:schemeClr val="tx1"/>
+            </a:solidFill>
+          </a:ln>
+        </p:spPr>
+        <p:style>
+          <a:lnRef idx="2">
+            <a:schemeClr val="accent1">
+              <a:shade val="50000"/>
+            </a:schemeClr>
+          </a:lnRef>
+          <a:fillRef idx="1">
+            <a:schemeClr val="accent1"/>
+          </a:fillRef>
+          <a:effectRef idx="0">
+            <a:schemeClr val="accent1"/>
+          </a:effectRef>
+          <a:fontRef idx="minor">
+            <a:schemeClr val="lt1"/>
+          </a:fontRef>
+        </p:style>
+        <p:txBody>
+          <a:bodyPr rtlCol="0" anchor="ctr"/>
+          <a:lstStyle/>
+          <a:p>
+            <a:pPr algn="ctr"/>
+            <a:endParaRPr lang="en-US" sz="1100" dirty="0">
+              <a:solidFill>
+                <a:schemeClr val="tx1"/>
+              </a:solidFill>
+              <a:latin typeface="Arial" panose="020B0604020202020204" pitchFamily="34" charset="0"/>
+              <a:cs typeface="Arial" panose="020B0604020202020204" pitchFamily="34" charset="0"/>
+            </a:endParaRPr>
+          </a:p>
+        </p:txBody>
+      </p:sp>
+      <p:sp>
+        <p:nvSpPr>
+          <p:cNvPr id="13" name="Rectangle 12">
+            <a:extLst>
+              <a:ext uri="{FF2B5EF4-FFF2-40B4-BE49-F238E27FC236}">
+                <a16:creationId xmlns:a16="http://schemas.microsoft.com/office/drawing/2014/main" id="{2484FC27-EBBE-44D0-8B09-970D647A4B36}"/>
+              </a:ext>
+            </a:extLst>
+          </p:cNvPr>
+          <p:cNvSpPr/>
+          <p:nvPr/>
+        </p:nvSpPr>
+        <p:spPr>
+          <a:xfrm>
+            <a:off x="3904247" y="818146"/>
+            <a:ext cx="1221205" cy="1221206"/>
+          </a:xfrm>
+          <a:prstGeom prst="rect">
+            <a:avLst/>
+          </a:prstGeom>
+          <a:noFill/>
+          <a:ln>
+            <a:solidFill>
+              <a:schemeClr val="tx1"/>
+            </a:solidFill>
+          </a:ln>
+        </p:spPr>
+        <p:style>
+          <a:lnRef idx="2">
+            <a:schemeClr val="accent1">
+              <a:shade val="50000"/>
+            </a:schemeClr>
+          </a:lnRef>
+          <a:fillRef idx="1">
+            <a:schemeClr val="accent1"/>
+          </a:fillRef>
+          <a:effectRef idx="0">
+            <a:schemeClr val="accent1"/>
+          </a:effectRef>
+          <a:fontRef idx="minor">
+            <a:schemeClr val="lt1"/>
+          </a:fontRef>
+        </p:style>
+        <p:txBody>
+          <a:bodyPr rtlCol="0" anchor="ctr"/>
+          <a:lstStyle/>
+          <a:p>
+            <a:pPr algn="ctr"/>
+            <a:r>
+              <a:rPr lang="en-US" sz="1600" dirty="0">
+                <a:solidFill>
+                  <a:schemeClr val="tx1"/>
+                </a:solidFill>
+                <a:latin typeface="Arial" panose="020B0604020202020204" pitchFamily="34" charset="0"/>
+                <a:cs typeface="Arial" panose="020B0604020202020204" pitchFamily="34" charset="0"/>
+              </a:rPr>
+              <a:t>39</a:t>
+            </a:r>
+          </a:p>
+          <a:p>
+            <a:pPr algn="ctr"/>
+            <a:r>
+              <a:rPr lang="en-US" sz="1100" dirty="0">
+                <a:solidFill>
+                  <a:schemeClr val="tx1"/>
+                </a:solidFill>
+                <a:latin typeface="Arial" panose="020B0604020202020204" pitchFamily="34" charset="0"/>
+                <a:cs typeface="Arial" panose="020B0604020202020204" pitchFamily="34" charset="0"/>
+              </a:rPr>
+              <a:t>True Positives</a:t>
+            </a:r>
+          </a:p>
+        </p:txBody>
+      </p:sp>
+      <p:sp>
+        <p:nvSpPr>
+          <p:cNvPr id="14" name="Rectangle 13">
+            <a:extLst>
+              <a:ext uri="{FF2B5EF4-FFF2-40B4-BE49-F238E27FC236}">
+                <a16:creationId xmlns:a16="http://schemas.microsoft.com/office/drawing/2014/main" id="{8EECAE8D-0E9D-4F9A-A6A8-35C1F2025ECA}"/>
+              </a:ext>
+            </a:extLst>
+          </p:cNvPr>
+          <p:cNvSpPr/>
+          <p:nvPr/>
+        </p:nvSpPr>
+        <p:spPr>
+          <a:xfrm>
+            <a:off x="5193629" y="818146"/>
+            <a:ext cx="1221205" cy="1221206"/>
+          </a:xfrm>
+          <a:prstGeom prst="rect">
+            <a:avLst/>
+          </a:prstGeom>
+          <a:noFill/>
+          <a:ln>
+            <a:solidFill>
+              <a:schemeClr val="tx1"/>
+            </a:solidFill>
+          </a:ln>
+        </p:spPr>
+        <p:style>
+          <a:lnRef idx="2">
+            <a:schemeClr val="accent1">
+              <a:shade val="50000"/>
+            </a:schemeClr>
+          </a:lnRef>
+          <a:fillRef idx="1">
+            <a:schemeClr val="accent1"/>
+          </a:fillRef>
+          <a:effectRef idx="0">
+            <a:schemeClr val="accent1"/>
+          </a:effectRef>
+          <a:fontRef idx="minor">
+            <a:schemeClr val="lt1"/>
+          </a:fontRef>
+        </p:style>
+        <p:txBody>
+          <a:bodyPr rtlCol="0" anchor="ctr"/>
+          <a:lstStyle/>
+          <a:p>
+            <a:pPr algn="ctr"/>
+            <a:r>
+              <a:rPr lang="en-US" sz="1600" dirty="0">
+                <a:solidFill>
+                  <a:schemeClr val="tx1"/>
+                </a:solidFill>
+                <a:latin typeface="Arial" panose="020B0604020202020204" pitchFamily="34" charset="0"/>
+                <a:cs typeface="Arial" panose="020B0604020202020204" pitchFamily="34" charset="0"/>
+              </a:rPr>
+              <a:t>1</a:t>
+            </a:r>
+          </a:p>
+          <a:p>
+            <a:pPr algn="ctr"/>
+            <a:r>
+              <a:rPr lang="en-US" sz="1100" dirty="0">
+                <a:solidFill>
+                  <a:schemeClr val="tx1"/>
+                </a:solidFill>
+                <a:latin typeface="Arial" panose="020B0604020202020204" pitchFamily="34" charset="0"/>
+                <a:cs typeface="Arial" panose="020B0604020202020204" pitchFamily="34" charset="0"/>
+              </a:rPr>
+              <a:t>False Positives</a:t>
+            </a:r>
+          </a:p>
+        </p:txBody>
+      </p:sp>
+      <p:sp>
+        <p:nvSpPr>
+          <p:cNvPr id="15" name="Rectangle 14">
+            <a:extLst>
+              <a:ext uri="{FF2B5EF4-FFF2-40B4-BE49-F238E27FC236}">
+                <a16:creationId xmlns:a16="http://schemas.microsoft.com/office/drawing/2014/main" id="{2F668DF0-CB88-4B2F-9456-247ACD786A64}"/>
+              </a:ext>
+            </a:extLst>
+          </p:cNvPr>
+          <p:cNvSpPr/>
+          <p:nvPr/>
+        </p:nvSpPr>
+        <p:spPr>
+          <a:xfrm>
+            <a:off x="3904246" y="2104522"/>
+            <a:ext cx="1221205" cy="1221206"/>
+          </a:xfrm>
+          <a:prstGeom prst="rect">
+            <a:avLst/>
+          </a:prstGeom>
+          <a:noFill/>
+          <a:ln>
+            <a:solidFill>
+              <a:schemeClr val="tx1"/>
+            </a:solidFill>
+          </a:ln>
+        </p:spPr>
+        <p:style>
+          <a:lnRef idx="2">
+            <a:schemeClr val="accent1">
+              <a:shade val="50000"/>
+            </a:schemeClr>
+          </a:lnRef>
+          <a:fillRef idx="1">
+            <a:schemeClr val="accent1"/>
+          </a:fillRef>
+          <a:effectRef idx="0">
+            <a:schemeClr val="accent1"/>
+          </a:effectRef>
+          <a:fontRef idx="minor">
+            <a:schemeClr val="lt1"/>
+          </a:fontRef>
+        </p:style>
+        <p:txBody>
+          <a:bodyPr rtlCol="0" anchor="ctr"/>
+          <a:lstStyle/>
+          <a:p>
+            <a:pPr algn="ctr"/>
+            <a:r>
+              <a:rPr lang="en-US" sz="1600" dirty="0">
+                <a:solidFill>
+                  <a:schemeClr val="tx1"/>
+                </a:solidFill>
+                <a:latin typeface="Arial" panose="020B0604020202020204" pitchFamily="34" charset="0"/>
+                <a:cs typeface="Arial" panose="020B0604020202020204" pitchFamily="34" charset="0"/>
+              </a:rPr>
+              <a:t>9</a:t>
+            </a:r>
+          </a:p>
+          <a:p>
+            <a:pPr algn="ctr"/>
+            <a:r>
+              <a:rPr lang="en-US" sz="1100" dirty="0">
+                <a:solidFill>
+                  <a:schemeClr val="tx1"/>
+                </a:solidFill>
+                <a:latin typeface="Arial" panose="020B0604020202020204" pitchFamily="34" charset="0"/>
+                <a:cs typeface="Arial" panose="020B0604020202020204" pitchFamily="34" charset="0"/>
+              </a:rPr>
+              <a:t>False Negatives</a:t>
+            </a:r>
+          </a:p>
+        </p:txBody>
+      </p:sp>
+      <p:sp>
+        <p:nvSpPr>
+          <p:cNvPr id="16" name="Rectangle 15">
+            <a:extLst>
+              <a:ext uri="{FF2B5EF4-FFF2-40B4-BE49-F238E27FC236}">
+                <a16:creationId xmlns:a16="http://schemas.microsoft.com/office/drawing/2014/main" id="{ACF9F314-44A0-4C3A-9E39-031397BB29F1}"/>
+              </a:ext>
+            </a:extLst>
+          </p:cNvPr>
+          <p:cNvSpPr/>
+          <p:nvPr/>
+        </p:nvSpPr>
+        <p:spPr>
+          <a:xfrm>
+            <a:off x="6483011" y="818146"/>
+            <a:ext cx="713232" cy="1221206"/>
+          </a:xfrm>
+          <a:prstGeom prst="rect">
+            <a:avLst/>
+          </a:prstGeom>
+          <a:noFill/>
+          <a:ln>
+            <a:solidFill>
+              <a:schemeClr val="tx1"/>
+            </a:solidFill>
+          </a:ln>
+        </p:spPr>
+        <p:style>
+          <a:lnRef idx="2">
+            <a:schemeClr val="accent1">
+              <a:shade val="50000"/>
+            </a:schemeClr>
+          </a:lnRef>
+          <a:fillRef idx="1">
+            <a:schemeClr val="accent1"/>
+          </a:fillRef>
+          <a:effectRef idx="0">
+            <a:schemeClr val="accent1"/>
+          </a:effectRef>
+          <a:fontRef idx="minor">
+            <a:schemeClr val="lt1"/>
+          </a:fontRef>
+        </p:style>
+        <p:txBody>
+          <a:bodyPr rtlCol="0" anchor="ctr"/>
+          <a:lstStyle/>
+          <a:p>
+            <a:pPr algn="ctr"/>
+            <a:r>
+              <a:rPr lang="en-US" sz="1600" dirty="0">
+                <a:solidFill>
+                  <a:schemeClr val="tx1"/>
+                </a:solidFill>
+                <a:latin typeface="Arial" panose="020B0604020202020204" pitchFamily="34" charset="0"/>
+                <a:cs typeface="Arial" panose="020B0604020202020204" pitchFamily="34" charset="0"/>
+              </a:rPr>
+              <a:t>40</a:t>
+            </a:r>
+          </a:p>
+          <a:p>
+            <a:pPr algn="ctr"/>
+            <a:r>
+              <a:rPr lang="en-US" sz="900" dirty="0">
+                <a:solidFill>
+                  <a:schemeClr val="tx1"/>
+                </a:solidFill>
+                <a:latin typeface="Arial" panose="020B0604020202020204" pitchFamily="34" charset="0"/>
+                <a:cs typeface="Arial" panose="020B0604020202020204" pitchFamily="34" charset="0"/>
+              </a:rPr>
+              <a:t>Total RDT Positives</a:t>
+            </a:r>
+          </a:p>
+        </p:txBody>
+      </p:sp>
+      <p:sp>
+        <p:nvSpPr>
+          <p:cNvPr id="17" name="Rectangle 16">
+            <a:extLst>
+              <a:ext uri="{FF2B5EF4-FFF2-40B4-BE49-F238E27FC236}">
+                <a16:creationId xmlns:a16="http://schemas.microsoft.com/office/drawing/2014/main" id="{A6909579-C98E-4736-A643-3DDDEAFBD9F3}"/>
+              </a:ext>
+            </a:extLst>
+          </p:cNvPr>
+          <p:cNvSpPr/>
+          <p:nvPr/>
+        </p:nvSpPr>
+        <p:spPr>
+          <a:xfrm>
+            <a:off x="6483011" y="2104522"/>
+            <a:ext cx="713232" cy="1221206"/>
+          </a:xfrm>
+          <a:prstGeom prst="rect">
+            <a:avLst/>
+          </a:prstGeom>
+          <a:noFill/>
+          <a:ln>
+            <a:solidFill>
+              <a:schemeClr val="tx1"/>
+            </a:solidFill>
+          </a:ln>
+        </p:spPr>
+        <p:style>
+          <a:lnRef idx="2">
+            <a:schemeClr val="accent1">
+              <a:shade val="50000"/>
+            </a:schemeClr>
+          </a:lnRef>
+          <a:fillRef idx="1">
+            <a:schemeClr val="accent1"/>
+          </a:fillRef>
+          <a:effectRef idx="0">
+            <a:schemeClr val="accent1"/>
+          </a:effectRef>
+          <a:fontRef idx="minor">
+            <a:schemeClr val="lt1"/>
+          </a:fontRef>
+        </p:style>
+        <p:txBody>
+          <a:bodyPr rtlCol="0" anchor="ctr"/>
+          <a:lstStyle/>
+          <a:p>
+            <a:pPr algn="ctr"/>
+            <a:r>
+              <a:rPr lang="en-US" sz="1600" dirty="0">
+                <a:solidFill>
+                  <a:schemeClr val="tx1"/>
+                </a:solidFill>
+                <a:latin typeface="Arial" panose="020B0604020202020204" pitchFamily="34" charset="0"/>
+                <a:cs typeface="Arial" panose="020B0604020202020204" pitchFamily="34" charset="0"/>
+              </a:rPr>
+              <a:t>27</a:t>
+            </a:r>
+          </a:p>
+          <a:p>
+            <a:pPr algn="ctr"/>
+            <a:r>
+              <a:rPr lang="en-US" sz="900" dirty="0">
+                <a:solidFill>
+                  <a:schemeClr val="tx1"/>
+                </a:solidFill>
+                <a:latin typeface="Arial" panose="020B0604020202020204" pitchFamily="34" charset="0"/>
+                <a:cs typeface="Arial" panose="020B0604020202020204" pitchFamily="34" charset="0"/>
+              </a:rPr>
+              <a:t>Total RDT Negatives</a:t>
+            </a:r>
+          </a:p>
+        </p:txBody>
+      </p:sp>
+      <p:sp>
+        <p:nvSpPr>
+          <p:cNvPr id="18" name="Rectangle 17">
+            <a:extLst>
+              <a:ext uri="{FF2B5EF4-FFF2-40B4-BE49-F238E27FC236}">
+                <a16:creationId xmlns:a16="http://schemas.microsoft.com/office/drawing/2014/main" id="{5EC58040-AE3D-4E0A-BC0A-4E3A506E0DA2}"/>
+              </a:ext>
+            </a:extLst>
+          </p:cNvPr>
+          <p:cNvSpPr/>
+          <p:nvPr/>
+        </p:nvSpPr>
+        <p:spPr>
+          <a:xfrm>
+            <a:off x="6483011" y="3390898"/>
+            <a:ext cx="713232" cy="711870"/>
+          </a:xfrm>
+          <a:prstGeom prst="rect">
+            <a:avLst/>
+          </a:prstGeom>
+          <a:noFill/>
+          <a:ln>
+            <a:solidFill>
+              <a:schemeClr val="tx1"/>
+            </a:solidFill>
+          </a:ln>
+        </p:spPr>
+        <p:style>
+          <a:lnRef idx="2">
+            <a:schemeClr val="accent1">
+              <a:shade val="50000"/>
+            </a:schemeClr>
+          </a:lnRef>
+          <a:fillRef idx="1">
+            <a:schemeClr val="accent1"/>
+          </a:fillRef>
+          <a:effectRef idx="0">
+            <a:schemeClr val="accent1"/>
+          </a:effectRef>
+          <a:fontRef idx="minor">
+            <a:schemeClr val="lt1"/>
+          </a:fontRef>
+        </p:style>
+        <p:txBody>
+          <a:bodyPr rtlCol="0" anchor="ctr"/>
+          <a:lstStyle/>
+          <a:p>
+            <a:pPr algn="ctr"/>
+            <a:r>
+              <a:rPr lang="en-US" sz="1600" dirty="0">
+                <a:solidFill>
+                  <a:schemeClr val="tx1"/>
+                </a:solidFill>
+                <a:latin typeface="Arial" panose="020B0604020202020204" pitchFamily="34" charset="0"/>
+                <a:cs typeface="Arial" panose="020B0604020202020204" pitchFamily="34" charset="0"/>
+              </a:rPr>
+              <a:t>67</a:t>
+            </a:r>
+          </a:p>
+          <a:p>
+            <a:pPr algn="ctr"/>
+            <a:r>
+              <a:rPr lang="en-US" sz="700" dirty="0">
+                <a:solidFill>
+                  <a:schemeClr val="tx1"/>
+                </a:solidFill>
+                <a:latin typeface="Arial" panose="020B0604020202020204" pitchFamily="34" charset="0"/>
+                <a:cs typeface="Arial" panose="020B0604020202020204" pitchFamily="34" charset="0"/>
+              </a:rPr>
+              <a:t>Total Conclusive RDT Results</a:t>
+            </a:r>
+          </a:p>
+        </p:txBody>
+      </p:sp>
+      <p:sp>
+        <p:nvSpPr>
+          <p:cNvPr id="19" name="Rectangle 18">
+            <a:extLst>
+              <a:ext uri="{FF2B5EF4-FFF2-40B4-BE49-F238E27FC236}">
+                <a16:creationId xmlns:a16="http://schemas.microsoft.com/office/drawing/2014/main" id="{C6C39675-269A-4ED3-97BD-05E4CCF46B52}"/>
+              </a:ext>
+            </a:extLst>
+          </p:cNvPr>
+          <p:cNvSpPr/>
+          <p:nvPr/>
+        </p:nvSpPr>
+        <p:spPr>
+          <a:xfrm>
+            <a:off x="3904245" y="3390898"/>
+            <a:ext cx="1221205" cy="711870"/>
+          </a:xfrm>
+          <a:prstGeom prst="rect">
+            <a:avLst/>
+          </a:prstGeom>
+          <a:noFill/>
+          <a:ln>
+            <a:solidFill>
+              <a:schemeClr val="tx1"/>
+            </a:solidFill>
+          </a:ln>
+        </p:spPr>
+        <p:style>
+          <a:lnRef idx="2">
+            <a:schemeClr val="accent1">
+              <a:shade val="50000"/>
+            </a:schemeClr>
+          </a:lnRef>
+          <a:fillRef idx="1">
+            <a:schemeClr val="accent1"/>
+          </a:fillRef>
+          <a:effectRef idx="0">
+            <a:schemeClr val="accent1"/>
+          </a:effectRef>
+          <a:fontRef idx="minor">
+            <a:schemeClr val="lt1"/>
+          </a:fontRef>
+        </p:style>
+        <p:txBody>
+          <a:bodyPr rtlCol="0" anchor="ctr"/>
+          <a:lstStyle/>
+          <a:p>
+            <a:pPr algn="ctr"/>
+            <a:r>
+              <a:rPr lang="en-US" sz="1600" dirty="0">
+                <a:solidFill>
+                  <a:schemeClr val="tx1"/>
+                </a:solidFill>
+                <a:latin typeface="Arial" panose="020B0604020202020204" pitchFamily="34" charset="0"/>
+                <a:cs typeface="Arial" panose="020B0604020202020204" pitchFamily="34" charset="0"/>
+              </a:rPr>
+              <a:t>48</a:t>
+            </a:r>
+          </a:p>
+          <a:p>
+            <a:pPr algn="ctr"/>
+            <a:r>
+              <a:rPr lang="en-US" sz="900" dirty="0">
+                <a:solidFill>
+                  <a:schemeClr val="tx1"/>
+                </a:solidFill>
+                <a:latin typeface="Arial" panose="020B0604020202020204" pitchFamily="34" charset="0"/>
+                <a:cs typeface="Arial" panose="020B0604020202020204" pitchFamily="34" charset="0"/>
+              </a:rPr>
+              <a:t>Total qPCR Positives</a:t>
+            </a:r>
+          </a:p>
+        </p:txBody>
+      </p:sp>
+      <p:sp>
+        <p:nvSpPr>
+          <p:cNvPr id="20" name="Rectangle 19">
+            <a:extLst>
+              <a:ext uri="{FF2B5EF4-FFF2-40B4-BE49-F238E27FC236}">
+                <a16:creationId xmlns:a16="http://schemas.microsoft.com/office/drawing/2014/main" id="{52374CBE-0E9F-4934-9499-C1E7632E861C}"/>
+              </a:ext>
+            </a:extLst>
+          </p:cNvPr>
+          <p:cNvSpPr/>
+          <p:nvPr/>
+        </p:nvSpPr>
+        <p:spPr>
+          <a:xfrm>
+            <a:off x="5193627" y="3390897"/>
+            <a:ext cx="1221205" cy="711870"/>
+          </a:xfrm>
+          <a:prstGeom prst="rect">
+            <a:avLst/>
+          </a:prstGeom>
+          <a:noFill/>
+          <a:ln>
+            <a:solidFill>
+              <a:schemeClr val="tx1"/>
+            </a:solidFill>
+          </a:ln>
+        </p:spPr>
+        <p:style>
+          <a:lnRef idx="2">
+            <a:schemeClr val="accent1">
+              <a:shade val="50000"/>
+            </a:schemeClr>
+          </a:lnRef>
+          <a:fillRef idx="1">
+            <a:schemeClr val="accent1"/>
+          </a:fillRef>
+          <a:effectRef idx="0">
+            <a:schemeClr val="accent1"/>
+          </a:effectRef>
+          <a:fontRef idx="minor">
+            <a:schemeClr val="lt1"/>
+          </a:fontRef>
+        </p:style>
+        <p:txBody>
+          <a:bodyPr rtlCol="0" anchor="ctr"/>
+          <a:lstStyle/>
+          <a:p>
+            <a:pPr algn="ctr"/>
+            <a:r>
+              <a:rPr lang="en-US" sz="1600" dirty="0">
+                <a:solidFill>
+                  <a:schemeClr val="tx1"/>
+                </a:solidFill>
+                <a:latin typeface="Arial" panose="020B0604020202020204" pitchFamily="34" charset="0"/>
+                <a:cs typeface="Arial" panose="020B0604020202020204" pitchFamily="34" charset="0"/>
+              </a:rPr>
+              <a:t>19</a:t>
+            </a:r>
+          </a:p>
+          <a:p>
+            <a:pPr algn="ctr"/>
+            <a:r>
+              <a:rPr lang="en-US" sz="900" dirty="0">
+                <a:solidFill>
+                  <a:schemeClr val="tx1"/>
+                </a:solidFill>
+                <a:latin typeface="Arial" panose="020B0604020202020204" pitchFamily="34" charset="0"/>
+                <a:cs typeface="Arial" panose="020B0604020202020204" pitchFamily="34" charset="0"/>
+              </a:rPr>
+              <a:t>Total qPCR Negatives</a:t>
+            </a:r>
+          </a:p>
+        </p:txBody>
+      </p:sp>
+      <p:sp>
+        <p:nvSpPr>
+          <p:cNvPr id="21" name="Rectangle 20">
+            <a:extLst>
+              <a:ext uri="{FF2B5EF4-FFF2-40B4-BE49-F238E27FC236}">
+                <a16:creationId xmlns:a16="http://schemas.microsoft.com/office/drawing/2014/main" id="{7B08B568-46BE-4708-984B-1D9B3820D2E7}"/>
+              </a:ext>
+            </a:extLst>
+          </p:cNvPr>
+          <p:cNvSpPr/>
+          <p:nvPr/>
+        </p:nvSpPr>
+        <p:spPr>
+          <a:xfrm rot="16200000">
+            <a:off x="3331742" y="3530262"/>
+            <a:ext cx="711871" cy="433135"/>
+          </a:xfrm>
+          <a:prstGeom prst="rect">
+            <a:avLst/>
+          </a:prstGeom>
+          <a:solidFill>
+            <a:schemeClr val="tx1"/>
+          </a:solidFill>
+          <a:ln>
+            <a:solidFill>
+              <a:schemeClr val="tx1"/>
+            </a:solidFill>
+          </a:ln>
+        </p:spPr>
+        <p:style>
+          <a:lnRef idx="2">
+            <a:schemeClr val="accent1">
+              <a:shade val="50000"/>
+            </a:schemeClr>
+          </a:lnRef>
+          <a:fillRef idx="1">
+            <a:schemeClr val="accent1"/>
+          </a:fillRef>
+          <a:effectRef idx="0">
+            <a:schemeClr val="accent1"/>
+          </a:effectRef>
+          <a:fontRef idx="minor">
+            <a:schemeClr val="lt1"/>
+          </a:fontRef>
+        </p:style>
+        <p:txBody>
+          <a:bodyPr rtlCol="0" anchor="ctr"/>
+          <a:lstStyle/>
+          <a:p>
+            <a:pPr algn="ctr"/>
+            <a:r>
+              <a:rPr lang="en-US" sz="1400" dirty="0">
+                <a:latin typeface="Arial" panose="020B0604020202020204" pitchFamily="34" charset="0"/>
+                <a:cs typeface="Arial" panose="020B0604020202020204" pitchFamily="34" charset="0"/>
+              </a:rPr>
+              <a:t>Totals</a:t>
+            </a:r>
+          </a:p>
+        </p:txBody>
+      </p:sp>
+      <p:sp>
+        <p:nvSpPr>
+          <p:cNvPr id="22" name="Rectangle 21">
+            <a:extLst>
+              <a:ext uri="{FF2B5EF4-FFF2-40B4-BE49-F238E27FC236}">
+                <a16:creationId xmlns:a16="http://schemas.microsoft.com/office/drawing/2014/main" id="{3460708B-DF60-4C99-A56A-23519633DE41}"/>
+              </a:ext>
+            </a:extLst>
+          </p:cNvPr>
+          <p:cNvSpPr/>
+          <p:nvPr/>
+        </p:nvSpPr>
+        <p:spPr>
+          <a:xfrm>
+            <a:off x="6483009" y="385009"/>
+            <a:ext cx="711871" cy="433135"/>
+          </a:xfrm>
+          <a:prstGeom prst="rect">
+            <a:avLst/>
+          </a:prstGeom>
+          <a:solidFill>
+            <a:schemeClr val="tx1"/>
+          </a:solidFill>
+          <a:ln>
+            <a:solidFill>
+              <a:schemeClr val="tx1"/>
+            </a:solidFill>
+          </a:ln>
+        </p:spPr>
+        <p:style>
+          <a:lnRef idx="2">
+            <a:schemeClr val="accent1">
+              <a:shade val="50000"/>
+            </a:schemeClr>
+          </a:lnRef>
+          <a:fillRef idx="1">
+            <a:schemeClr val="accent1"/>
+          </a:fillRef>
+          <a:effectRef idx="0">
+            <a:schemeClr val="accent1"/>
+          </a:effectRef>
+          <a:fontRef idx="minor">
+            <a:schemeClr val="lt1"/>
+          </a:fontRef>
+        </p:style>
+        <p:txBody>
+          <a:bodyPr rtlCol="0" anchor="ctr"/>
+          <a:lstStyle/>
+          <a:p>
+            <a:pPr algn="ctr"/>
+            <a:r>
+              <a:rPr lang="en-US" sz="1400" dirty="0">
+                <a:latin typeface="Arial" panose="020B0604020202020204" pitchFamily="34" charset="0"/>
+                <a:cs typeface="Arial" panose="020B0604020202020204" pitchFamily="34" charset="0"/>
+              </a:rPr>
+              <a:t>Totals</a:t>
+            </a:r>
+          </a:p>
+        </p:txBody>
+      </p:sp>
+      <p:graphicFrame>
+        <p:nvGraphicFramePr>
+          <p:cNvPr id="23" name="Table 23">
+            <a:extLst>
+              <a:ext uri="{FF2B5EF4-FFF2-40B4-BE49-F238E27FC236}">
+                <a16:creationId xmlns:a16="http://schemas.microsoft.com/office/drawing/2014/main" id="{938EF49C-A29E-4C3A-9F46-E76315263ABA}"/>
+              </a:ext>
+            </a:extLst>
+          </p:cNvPr>
+          <p:cNvGraphicFramePr>
+            <a:graphicFrameLocks noGrp="1"/>
+          </p:cNvGraphicFramePr>
+          <p:nvPr>
+            <p:extLst>
+              <p:ext uri="{D42A27DB-BD31-4B8C-83A1-F6EECF244321}">
+                <p14:modId xmlns:p14="http://schemas.microsoft.com/office/powerpoint/2010/main" val="896619249"/>
+              </p:ext>
+            </p:extLst>
+          </p:nvPr>
+        </p:nvGraphicFramePr>
+        <p:xfrm>
+          <a:off x="3469745" y="4164923"/>
+          <a:ext cx="3725135" cy="2189480"/>
+        </p:xfrm>
+        <a:graphic>
+          <a:graphicData uri="http://schemas.openxmlformats.org/drawingml/2006/table">
+            <a:tbl>
+              <a:tblPr firstRow="1">
+                <a:tableStyleId>{7E9639D4-E3E2-4D34-9284-5A2195B3D0D7}</a:tableStyleId>
+              </a:tblPr>
+              <a:tblGrid>
+                <a:gridCol w="1807144">
+                  <a:extLst>
+                    <a:ext uri="{9D8B030D-6E8A-4147-A177-3AD203B41FA5}">
+                      <a16:colId xmlns:a16="http://schemas.microsoft.com/office/drawing/2014/main" val="2042157408"/>
+                    </a:ext>
+                  </a:extLst>
+                </a:gridCol>
+                <a:gridCol w="1917991">
+                  <a:extLst>
+                    <a:ext uri="{9D8B030D-6E8A-4147-A177-3AD203B41FA5}">
+                      <a16:colId xmlns:a16="http://schemas.microsoft.com/office/drawing/2014/main" val="504630976"/>
+                    </a:ext>
+                  </a:extLst>
+                </a:gridCol>
+              </a:tblGrid>
+              <a:tr h="370840">
+                <a:tc>
+                  <a:txBody>
+                    <a:bodyPr/>
+                    <a:lstStyle/>
+                    <a:p>
+                      <a:pPr algn="ctr"/>
+                      <a:r>
+                        <a:rPr lang="en-US" sz="1600" dirty="0">
+                          <a:latin typeface="Arial" panose="020B0604020202020204" pitchFamily="34" charset="0"/>
+                          <a:cs typeface="Arial" panose="020B0604020202020204" pitchFamily="34" charset="0"/>
+                        </a:rPr>
+                        <a:t>Statistics</a:t>
+                      </a:r>
+                    </a:p>
+                  </a:txBody>
+                  <a:tcPr anchor="ctr">
+                    <a:lnB w="12700" cap="flat" cmpd="sng" algn="ctr">
+                      <a:solidFill>
+                        <a:schemeClr val="tx1"/>
+                      </a:solidFill>
+                      <a:prstDash val="solid"/>
+                      <a:round/>
+                      <a:headEnd type="none" w="med" len="med"/>
+                      <a:tailEnd type="none" w="med" len="med"/>
+                    </a:lnB>
+                  </a:tcPr>
+                </a:tc>
+                <a:tc>
+                  <a:txBody>
+                    <a:bodyPr/>
+                    <a:lstStyle/>
+                    <a:p>
+                      <a:r>
+                        <a:rPr lang="en-US" sz="1200" dirty="0">
+                          <a:latin typeface="Arial" panose="020B0604020202020204" pitchFamily="34" charset="0"/>
+                          <a:cs typeface="Arial" panose="020B0604020202020204" pitchFamily="34" charset="0"/>
+                        </a:rPr>
+                        <a:t>(with regards to </a:t>
+                      </a:r>
+                    </a:p>
+                    <a:p>
+                      <a:r>
+                        <a:rPr lang="en-US" sz="1200" dirty="0">
+                          <a:latin typeface="Arial" panose="020B0604020202020204" pitchFamily="34" charset="0"/>
+                          <a:cs typeface="Arial" panose="020B0604020202020204" pitchFamily="34" charset="0"/>
+                        </a:rPr>
+                        <a:t>RDT performance)</a:t>
+                      </a:r>
+                      <a:endParaRPr lang="en-US" sz="1600" dirty="0">
+                        <a:latin typeface="Arial" panose="020B0604020202020204" pitchFamily="34" charset="0"/>
+                        <a:cs typeface="Arial" panose="020B0604020202020204" pitchFamily="34" charset="0"/>
+                      </a:endParaRPr>
+                    </a:p>
+                  </a:txBody>
+                  <a:tcPr anchor="ctr">
+                    <a:lnB w="12700" cap="flat" cmpd="sng" algn="ctr">
+                      <a:solidFill>
+                        <a:schemeClr val="tx1"/>
+                      </a:solidFill>
+                      <a:prstDash val="solid"/>
+                      <a:round/>
+                      <a:headEnd type="none" w="med" len="med"/>
+                      <a:tailEnd type="none" w="med" len="med"/>
+                    </a:lnB>
+                  </a:tcPr>
+                </a:tc>
+                <a:extLst>
+                  <a:ext uri="{0D108BD9-81ED-4DB2-BD59-A6C34878D82A}">
+                    <a16:rowId xmlns:a16="http://schemas.microsoft.com/office/drawing/2014/main" val="1538450129"/>
+                  </a:ext>
+                </a:extLst>
+              </a:tr>
+              <a:tr h="370840">
+                <a:tc>
+                  <a:txBody>
+                    <a:bodyPr/>
+                    <a:lstStyle/>
+                    <a:p>
+                      <a:r>
+                        <a:rPr lang="en-US" sz="1600" dirty="0">
+                          <a:latin typeface="Arial" panose="020B0604020202020204" pitchFamily="34" charset="0"/>
+                          <a:cs typeface="Arial" panose="020B0604020202020204" pitchFamily="34" charset="0"/>
+                        </a:rPr>
+                        <a:t>Accuracy</a:t>
+                      </a:r>
+                    </a:p>
+                  </a:txBody>
+                  <a:tcPr anchor="ctr">
+                    <a:lnL w="12700" cap="flat" cmpd="sng" algn="ctr">
+                      <a:solidFill>
+                        <a:schemeClr val="tx1"/>
+                      </a:solidFill>
+                      <a:prstDash val="solid"/>
+                      <a:round/>
+                      <a:headEnd type="none" w="med" len="med"/>
+                      <a:tailEnd type="none" w="med" len="med"/>
+                    </a:lnL>
+                    <a:lnR w="12700" cap="flat" cmpd="sng" algn="ctr">
+                      <a:solidFill>
+                        <a:schemeClr val="tx1"/>
+                      </a:solidFill>
+                      <a:prstDash val="solid"/>
+                      <a:round/>
+                      <a:headEnd type="none" w="med" len="med"/>
+                      <a:tailEnd type="none" w="med" len="med"/>
+                    </a:lnR>
+                    <a:lnT w="12700" cap="flat" cmpd="sng" algn="ctr">
+                      <a:solidFill>
+                        <a:schemeClr val="tx1"/>
+                      </a:solidFill>
+                      <a:prstDash val="solid"/>
+                      <a:round/>
+                      <a:headEnd type="none" w="med" len="med"/>
+                      <a:tailEnd type="none" w="med" len="med"/>
+                    </a:lnT>
+                    <a:lnB w="12700" cap="flat" cmpd="sng" algn="ctr">
+                      <a:solidFill>
+                        <a:schemeClr val="tx1"/>
+                      </a:solidFill>
+                      <a:prstDash val="solid"/>
+                      <a:round/>
+                      <a:headEnd type="none" w="med" len="med"/>
+                      <a:tailEnd type="none" w="med" len="med"/>
+                    </a:lnB>
+                    <a:lnTlToBr w="12700" cmpd="sng">
+                      <a:noFill/>
+                      <a:prstDash val="solid"/>
+                    </a:lnTlToBr>
+                    <a:lnBlToTr w="12700" cmpd="sng">
+                      <a:noFill/>
+                      <a:prstDash val="solid"/>
+                    </a:lnBlToTr>
+                  </a:tcPr>
+                </a:tc>
+                <a:tc>
+                  <a:txBody>
+                    <a:bodyPr/>
+                    <a:lstStyle/>
+                    <a:p>
+                      <a:pPr algn="ctr"/>
+                      <a:r>
+                        <a:rPr lang="en-US" sz="1600" dirty="0">
+                          <a:latin typeface="Arial" panose="020B0604020202020204" pitchFamily="34" charset="0"/>
+                          <a:cs typeface="Arial" panose="020B0604020202020204" pitchFamily="34" charset="0"/>
+                        </a:rPr>
+                        <a:t>85.1%</a:t>
+                      </a:r>
+                    </a:p>
+                  </a:txBody>
+                  <a:tcPr anchor="ctr">
+                    <a:lnL w="12700" cap="flat" cmpd="sng" algn="ctr">
+                      <a:solidFill>
+                        <a:schemeClr val="tx1"/>
+                      </a:solidFill>
+                      <a:prstDash val="solid"/>
+                      <a:round/>
+                      <a:headEnd type="none" w="med" len="med"/>
+                      <a:tailEnd type="none" w="med" len="med"/>
+                    </a:lnL>
+                    <a:lnR w="12700" cap="flat" cmpd="sng" algn="ctr">
+                      <a:solidFill>
+                        <a:schemeClr val="tx1"/>
+                      </a:solidFill>
+                      <a:prstDash val="solid"/>
+                      <a:round/>
+                      <a:headEnd type="none" w="med" len="med"/>
+                      <a:tailEnd type="none" w="med" len="med"/>
+                    </a:lnR>
+                    <a:lnT w="12700" cap="flat" cmpd="sng" algn="ctr">
+                      <a:solidFill>
+                        <a:schemeClr val="tx1"/>
+                      </a:solidFill>
+                      <a:prstDash val="solid"/>
+                      <a:round/>
+                      <a:headEnd type="none" w="med" len="med"/>
+                      <a:tailEnd type="none" w="med" len="med"/>
+                    </a:lnT>
+                    <a:lnB w="12700" cap="flat" cmpd="sng" algn="ctr">
+                      <a:solidFill>
+                        <a:schemeClr val="tx1"/>
+                      </a:solidFill>
+                      <a:prstDash val="solid"/>
+                      <a:round/>
+                      <a:headEnd type="none" w="med" len="med"/>
+                      <a:tailEnd type="none" w="med" len="med"/>
+                    </a:lnB>
+                    <a:lnTlToBr w="12700" cmpd="sng">
+                      <a:noFill/>
+                      <a:prstDash val="solid"/>
+                    </a:lnTlToBr>
+                    <a:lnBlToTr w="12700" cmpd="sng">
+                      <a:noFill/>
+                      <a:prstDash val="solid"/>
+                    </a:lnBlToTr>
+                  </a:tcPr>
+                </a:tc>
+                <a:extLst>
+                  <a:ext uri="{0D108BD9-81ED-4DB2-BD59-A6C34878D82A}">
+                    <a16:rowId xmlns:a16="http://schemas.microsoft.com/office/drawing/2014/main" val="4157209075"/>
+                  </a:ext>
+                </a:extLst>
+              </a:tr>
+              <a:tr h="370840">
+                <a:tc>
+                  <a:txBody>
+                    <a:bodyPr/>
+                    <a:lstStyle/>
+                    <a:p>
+                      <a:r>
+                        <a:rPr lang="en-US" sz="1600" dirty="0">
+                          <a:latin typeface="Arial" panose="020B0604020202020204" pitchFamily="34" charset="0"/>
+                          <a:cs typeface="Arial" panose="020B0604020202020204" pitchFamily="34" charset="0"/>
+                        </a:rPr>
+                        <a:t>Sensitivity</a:t>
+                      </a:r>
+                    </a:p>
+                    <a:p>
+                      <a:r>
+                        <a:rPr lang="en-US" sz="1050" dirty="0">
+                          <a:latin typeface="Arial" panose="020B0604020202020204" pitchFamily="34" charset="0"/>
+                          <a:cs typeface="Arial" panose="020B0604020202020204" pitchFamily="34" charset="0"/>
+                        </a:rPr>
+                        <a:t>(True Positive Rate)</a:t>
+                      </a:r>
+                    </a:p>
+                  </a:txBody>
+                  <a:tcPr anchor="ctr">
+                    <a:lnL w="12700" cap="flat" cmpd="sng" algn="ctr">
+                      <a:solidFill>
+                        <a:schemeClr val="tx1"/>
+                      </a:solidFill>
+                      <a:prstDash val="solid"/>
+                      <a:round/>
+                      <a:headEnd type="none" w="med" len="med"/>
+                      <a:tailEnd type="none" w="med" len="med"/>
+                    </a:lnL>
+                    <a:lnR w="12700" cap="flat" cmpd="sng" algn="ctr">
+                      <a:solidFill>
+                        <a:schemeClr val="tx1"/>
+                      </a:solidFill>
+                      <a:prstDash val="solid"/>
+                      <a:round/>
+                      <a:headEnd type="none" w="med" len="med"/>
+                      <a:tailEnd type="none" w="med" len="med"/>
+                    </a:lnR>
+                    <a:lnT w="12700" cap="flat" cmpd="sng" algn="ctr">
+                      <a:solidFill>
+                        <a:schemeClr val="tx1"/>
+                      </a:solidFill>
+                      <a:prstDash val="solid"/>
+                      <a:round/>
+                      <a:headEnd type="none" w="med" len="med"/>
+                      <a:tailEnd type="none" w="med" len="med"/>
+                    </a:lnT>
+                    <a:lnB w="12700" cap="flat" cmpd="sng" algn="ctr">
+                      <a:solidFill>
+                        <a:schemeClr val="tx1"/>
+                      </a:solidFill>
+                      <a:prstDash val="solid"/>
+                      <a:round/>
+                      <a:headEnd type="none" w="med" len="med"/>
+                      <a:tailEnd type="none" w="med" len="med"/>
+                    </a:lnB>
+                    <a:lnTlToBr w="12700" cmpd="sng">
+                      <a:noFill/>
+                      <a:prstDash val="solid"/>
+                    </a:lnTlToBr>
+                    <a:lnBlToTr w="12700" cmpd="sng">
+                      <a:noFill/>
+                      <a:prstDash val="solid"/>
+                    </a:lnBlToTr>
+                  </a:tcPr>
+                </a:tc>
+                <a:tc>
+                  <a:txBody>
+                    <a:bodyPr/>
+                    <a:lstStyle/>
+                    <a:p>
+                      <a:pPr algn="ctr"/>
+                      <a:r>
+                        <a:rPr lang="en-US" sz="1600" dirty="0">
+                          <a:latin typeface="Arial" panose="020B0604020202020204" pitchFamily="34" charset="0"/>
+                          <a:cs typeface="Arial" panose="020B0604020202020204" pitchFamily="34" charset="0"/>
+                        </a:rPr>
+                        <a:t>81.3%</a:t>
+                      </a:r>
+                    </a:p>
+                  </a:txBody>
+                  <a:tcPr anchor="ctr">
+                    <a:lnL w="12700" cap="flat" cmpd="sng" algn="ctr">
+                      <a:solidFill>
+                        <a:schemeClr val="tx1"/>
+                      </a:solidFill>
+                      <a:prstDash val="solid"/>
+                      <a:round/>
+                      <a:headEnd type="none" w="med" len="med"/>
+                      <a:tailEnd type="none" w="med" len="med"/>
+                    </a:lnL>
+                    <a:lnR w="12700" cap="flat" cmpd="sng" algn="ctr">
+                      <a:solidFill>
+                        <a:schemeClr val="tx1"/>
+                      </a:solidFill>
+                      <a:prstDash val="solid"/>
+                      <a:round/>
+                      <a:headEnd type="none" w="med" len="med"/>
+                      <a:tailEnd type="none" w="med" len="med"/>
+                    </a:lnR>
+                    <a:lnT w="12700" cap="flat" cmpd="sng" algn="ctr">
+                      <a:solidFill>
+                        <a:schemeClr val="tx1"/>
+                      </a:solidFill>
+                      <a:prstDash val="solid"/>
+                      <a:round/>
+                      <a:headEnd type="none" w="med" len="med"/>
+                      <a:tailEnd type="none" w="med" len="med"/>
+                    </a:lnT>
+                    <a:lnB w="12700" cap="flat" cmpd="sng" algn="ctr">
+                      <a:solidFill>
+                        <a:schemeClr val="tx1"/>
+                      </a:solidFill>
+                      <a:prstDash val="solid"/>
+                      <a:round/>
+                      <a:headEnd type="none" w="med" len="med"/>
+                      <a:tailEnd type="none" w="med" len="med"/>
+                    </a:lnB>
+                    <a:lnTlToBr w="12700" cmpd="sng">
+                      <a:noFill/>
+                      <a:prstDash val="solid"/>
+                    </a:lnTlToBr>
+                    <a:lnBlToTr w="12700" cmpd="sng">
+                      <a:noFill/>
+                      <a:prstDash val="solid"/>
+                    </a:lnBlToTr>
+                  </a:tcPr>
+                </a:tc>
+                <a:extLst>
+                  <a:ext uri="{0D108BD9-81ED-4DB2-BD59-A6C34878D82A}">
+                    <a16:rowId xmlns:a16="http://schemas.microsoft.com/office/drawing/2014/main" val="2573456999"/>
+                  </a:ext>
+                </a:extLst>
+              </a:tr>
+              <a:tr h="370840">
+                <a:tc>
+                  <a:txBody>
+                    <a:bodyPr/>
+                    <a:lstStyle/>
+                    <a:p>
+                      <a:r>
+                        <a:rPr lang="en-US" sz="1600" dirty="0">
+                          <a:latin typeface="Arial" panose="020B0604020202020204" pitchFamily="34" charset="0"/>
+                          <a:cs typeface="Arial" panose="020B0604020202020204" pitchFamily="34" charset="0"/>
+                        </a:rPr>
+                        <a:t>Specificity</a:t>
+                      </a:r>
+                    </a:p>
+                    <a:p>
+                      <a:pPr marL="0" marR="0" lvl="0" indent="0" algn="l" defTabSz="914400" rtl="0" eaLnBrk="1" fontAlgn="auto" latinLnBrk="0" hangingPunct="1">
+                        <a:lnSpc>
+                          <a:spcPct val="100000"/>
+                        </a:lnSpc>
+                        <a:spcBef>
+                          <a:spcPts val="0"/>
+                        </a:spcBef>
+                        <a:spcAft>
+                          <a:spcPts val="0"/>
+                        </a:spcAft>
+                        <a:buClrTx/>
+                        <a:buSzTx/>
+                        <a:buFontTx/>
+                        <a:buNone/>
+                        <a:tabLst/>
+                        <a:defRPr/>
+                      </a:pPr>
+                      <a:r>
+                        <a:rPr kumimoji="0" lang="en-US" sz="1050" b="0" u="none" strike="noStrike" kern="1200" cap="none" spc="0" normalizeH="0" baseline="0" noProof="0" dirty="0">
+                          <a:ln>
+                            <a:noFill/>
+                          </a:ln>
+                          <a:solidFill>
+                            <a:prstClr val="black"/>
+                          </a:solidFill>
+                          <a:effectLst/>
+                          <a:uLnTx/>
+                          <a:uFillTx/>
+                          <a:latin typeface="Arial" panose="020B0604020202020204" pitchFamily="34" charset="0"/>
+                          <a:cs typeface="Arial" panose="020B0604020202020204" pitchFamily="34" charset="0"/>
+                        </a:rPr>
+                        <a:t>(True Negative Rate)</a:t>
+                      </a:r>
+                      <a:endParaRPr kumimoji="0" lang="en-US" sz="1050" b="0" i="0" u="none" strike="noStrike" kern="1200" cap="none" spc="0" normalizeH="0" baseline="0" noProof="0" dirty="0">
+                        <a:ln>
+                          <a:noFill/>
+                        </a:ln>
+                        <a:solidFill>
+                          <a:prstClr val="black"/>
+                        </a:solidFill>
+                        <a:effectLst/>
+                        <a:uLnTx/>
+                        <a:uFillTx/>
+                        <a:latin typeface="Arial" panose="020B0604020202020204" pitchFamily="34" charset="0"/>
+                        <a:ea typeface="+mn-ea"/>
+                        <a:cs typeface="Arial" panose="020B0604020202020204" pitchFamily="34" charset="0"/>
+                      </a:endParaRPr>
+                    </a:p>
+                  </a:txBody>
+                  <a:tcPr anchor="ctr">
+                    <a:lnL w="12700" cap="flat" cmpd="sng" algn="ctr">
+                      <a:solidFill>
+                        <a:schemeClr val="tx1"/>
+                      </a:solidFill>
+                      <a:prstDash val="solid"/>
+                      <a:round/>
+                      <a:headEnd type="none" w="med" len="med"/>
+                      <a:tailEnd type="none" w="med" len="med"/>
+                    </a:lnL>
+                    <a:lnR w="12700" cap="flat" cmpd="sng" algn="ctr">
+                      <a:solidFill>
+                        <a:schemeClr val="tx1"/>
+                      </a:solidFill>
+                      <a:prstDash val="solid"/>
+                      <a:round/>
+                      <a:headEnd type="none" w="med" len="med"/>
+                      <a:tailEnd type="none" w="med" len="med"/>
+                    </a:lnR>
+                    <a:lnT w="12700" cap="flat" cmpd="sng" algn="ctr">
+                      <a:solidFill>
+                        <a:schemeClr val="tx1"/>
+                      </a:solidFill>
+                      <a:prstDash val="solid"/>
+                      <a:round/>
+                      <a:headEnd type="none" w="med" len="med"/>
+                      <a:tailEnd type="none" w="med" len="med"/>
+                    </a:lnT>
+                    <a:lnB w="12700" cap="flat" cmpd="sng" algn="ctr">
+                      <a:solidFill>
+                        <a:schemeClr val="tx1"/>
+                      </a:solidFill>
+                      <a:prstDash val="solid"/>
+                      <a:round/>
+                      <a:headEnd type="none" w="med" len="med"/>
+                      <a:tailEnd type="none" w="med" len="med"/>
+                    </a:lnB>
+                    <a:lnTlToBr w="12700" cmpd="sng">
+                      <a:noFill/>
+                      <a:prstDash val="solid"/>
+                    </a:lnTlToBr>
+                    <a:lnBlToTr w="12700" cmpd="sng">
+                      <a:noFill/>
+                      <a:prstDash val="solid"/>
+                    </a:lnBlToTr>
+                  </a:tcPr>
+                </a:tc>
+                <a:tc>
+                  <a:txBody>
+                    <a:bodyPr/>
+                    <a:lstStyle/>
+                    <a:p>
+                      <a:pPr algn="ctr"/>
+                      <a:r>
+                        <a:rPr lang="en-US" sz="1600" dirty="0">
+                          <a:latin typeface="Arial" panose="020B0604020202020204" pitchFamily="34" charset="0"/>
+                          <a:cs typeface="Arial" panose="020B0604020202020204" pitchFamily="34" charset="0"/>
+                        </a:rPr>
+                        <a:t>94.7%</a:t>
+                      </a:r>
+                    </a:p>
+                  </a:txBody>
+                  <a:tcPr anchor="ctr">
+                    <a:lnL w="12700" cap="flat" cmpd="sng" algn="ctr">
+                      <a:solidFill>
+                        <a:schemeClr val="tx1"/>
+                      </a:solidFill>
+                      <a:prstDash val="solid"/>
+                      <a:round/>
+                      <a:headEnd type="none" w="med" len="med"/>
+                      <a:tailEnd type="none" w="med" len="med"/>
+                    </a:lnL>
+                    <a:lnR w="12700" cap="flat" cmpd="sng" algn="ctr">
+                      <a:solidFill>
+                        <a:schemeClr val="tx1"/>
+                      </a:solidFill>
+                      <a:prstDash val="solid"/>
+                      <a:round/>
+                      <a:headEnd type="none" w="med" len="med"/>
+                      <a:tailEnd type="none" w="med" len="med"/>
+                    </a:lnR>
+                    <a:lnT w="12700" cap="flat" cmpd="sng" algn="ctr">
+                      <a:solidFill>
+                        <a:schemeClr val="tx1"/>
+                      </a:solidFill>
+                      <a:prstDash val="solid"/>
+                      <a:round/>
+                      <a:headEnd type="none" w="med" len="med"/>
+                      <a:tailEnd type="none" w="med" len="med"/>
+                    </a:lnT>
+                    <a:lnB w="12700" cap="flat" cmpd="sng" algn="ctr">
+                      <a:solidFill>
+                        <a:schemeClr val="tx1"/>
+                      </a:solidFill>
+                      <a:prstDash val="solid"/>
+                      <a:round/>
+                      <a:headEnd type="none" w="med" len="med"/>
+                      <a:tailEnd type="none" w="med" len="med"/>
+                    </a:lnB>
+                    <a:lnTlToBr w="12700" cmpd="sng">
+                      <a:noFill/>
+                      <a:prstDash val="solid"/>
+                    </a:lnTlToBr>
+                    <a:lnBlToTr w="12700" cmpd="sng">
+                      <a:noFill/>
+                      <a:prstDash val="solid"/>
+                    </a:lnBlToTr>
+                  </a:tcPr>
+                </a:tc>
+                <a:extLst>
+                  <a:ext uri="{0D108BD9-81ED-4DB2-BD59-A6C34878D82A}">
+                    <a16:rowId xmlns:a16="http://schemas.microsoft.com/office/drawing/2014/main" val="1092511420"/>
+                  </a:ext>
+                </a:extLst>
+              </a:tr>
+              <a:tr h="370840">
+                <a:tc>
+                  <a:txBody>
+                    <a:bodyPr/>
+                    <a:lstStyle/>
+                    <a:p>
+                      <a:pPr marL="0" marR="0" lvl="0" indent="0" algn="l" defTabSz="914400" rtl="0" eaLnBrk="1" fontAlgn="auto" latinLnBrk="0" hangingPunct="1">
+                        <a:lnSpc>
+                          <a:spcPct val="100000"/>
+                        </a:lnSpc>
+                        <a:spcBef>
+                          <a:spcPts val="0"/>
+                        </a:spcBef>
+                        <a:spcAft>
+                          <a:spcPts val="0"/>
+                        </a:spcAft>
+                        <a:buClrTx/>
+                        <a:buSzTx/>
+                        <a:buFontTx/>
+                        <a:buNone/>
+                        <a:tabLst/>
+                        <a:defRPr/>
+                      </a:pPr>
+                      <a:r>
+                        <a:rPr kumimoji="0" lang="en-US" sz="1600" b="0" u="none" strike="noStrike" kern="1200" cap="none" spc="0" normalizeH="0" baseline="0" noProof="0" dirty="0">
+                          <a:ln>
+                            <a:noFill/>
+                          </a:ln>
+                          <a:solidFill>
+                            <a:prstClr val="black"/>
+                          </a:solidFill>
+                          <a:effectLst/>
+                          <a:uLnTx/>
+                          <a:uFillTx/>
+                          <a:latin typeface="Arial" panose="020B0604020202020204" pitchFamily="34" charset="0"/>
+                          <a:cs typeface="Arial" panose="020B0604020202020204" pitchFamily="34" charset="0"/>
+                        </a:rPr>
+                        <a:t>F</a:t>
+                      </a:r>
+                      <a:r>
+                        <a:rPr kumimoji="0" lang="en-US" sz="1600" b="0" u="none" strike="noStrike" kern="1200" cap="none" spc="0" normalizeH="0" baseline="-25000" noProof="0" dirty="0">
+                          <a:ln>
+                            <a:noFill/>
+                          </a:ln>
+                          <a:solidFill>
+                            <a:prstClr val="black"/>
+                          </a:solidFill>
+                          <a:effectLst/>
+                          <a:uLnTx/>
+                          <a:uFillTx/>
+                          <a:latin typeface="Arial" panose="020B0604020202020204" pitchFamily="34" charset="0"/>
+                          <a:cs typeface="Arial" panose="020B0604020202020204" pitchFamily="34" charset="0"/>
+                        </a:rPr>
+                        <a:t>1</a:t>
+                      </a:r>
+                      <a:r>
+                        <a:rPr kumimoji="0" lang="en-US" sz="1600" b="0" u="none" strike="noStrike" kern="1200" cap="none" spc="0" normalizeH="0" baseline="0" noProof="0" dirty="0">
+                          <a:ln>
+                            <a:noFill/>
+                          </a:ln>
+                          <a:solidFill>
+                            <a:prstClr val="black"/>
+                          </a:solidFill>
+                          <a:effectLst/>
+                          <a:uLnTx/>
+                          <a:uFillTx/>
+                          <a:latin typeface="Arial" panose="020B0604020202020204" pitchFamily="34" charset="0"/>
+                          <a:cs typeface="Arial" panose="020B0604020202020204" pitchFamily="34" charset="0"/>
+                        </a:rPr>
+                        <a:t> Score</a:t>
+                      </a:r>
+                      <a:endParaRPr kumimoji="0" lang="en-US" sz="1600" b="0" i="0" u="none" strike="noStrike" kern="1200" cap="none" spc="0" normalizeH="0" baseline="0" noProof="0" dirty="0">
+                        <a:ln>
+                          <a:noFill/>
+                        </a:ln>
+                        <a:solidFill>
+                          <a:prstClr val="black"/>
+                        </a:solidFill>
+                        <a:effectLst/>
+                        <a:uLnTx/>
+                        <a:uFillTx/>
+                        <a:latin typeface="Arial" panose="020B0604020202020204" pitchFamily="34" charset="0"/>
+                        <a:ea typeface="+mn-ea"/>
+                        <a:cs typeface="Arial" panose="020B0604020202020204" pitchFamily="34" charset="0"/>
+                      </a:endParaRPr>
+                    </a:p>
+                  </a:txBody>
+                  <a:tcPr anchor="ctr">
+                    <a:lnL w="12700" cap="flat" cmpd="sng" algn="ctr">
+                      <a:solidFill>
+                        <a:schemeClr val="tx1"/>
+                      </a:solidFill>
+                      <a:prstDash val="solid"/>
+                      <a:round/>
+                      <a:headEnd type="none" w="med" len="med"/>
+                      <a:tailEnd type="none" w="med" len="med"/>
+                    </a:lnL>
+                    <a:lnR w="12700" cap="flat" cmpd="sng" algn="ctr">
+                      <a:solidFill>
+                        <a:schemeClr val="tx1"/>
+                      </a:solidFill>
+                      <a:prstDash val="solid"/>
+                      <a:round/>
+                      <a:headEnd type="none" w="med" len="med"/>
+                      <a:tailEnd type="none" w="med" len="med"/>
+                    </a:lnR>
+                    <a:lnT w="12700" cap="flat" cmpd="sng" algn="ctr">
+                      <a:solidFill>
+                        <a:schemeClr val="tx1"/>
+                      </a:solidFill>
+                      <a:prstDash val="solid"/>
+                      <a:round/>
+                      <a:headEnd type="none" w="med" len="med"/>
+                      <a:tailEnd type="none" w="med" len="med"/>
+                    </a:lnT>
+                    <a:lnB w="12700" cap="flat" cmpd="sng" algn="ctr">
+                      <a:solidFill>
+                        <a:schemeClr val="tx1"/>
+                      </a:solidFill>
+                      <a:prstDash val="solid"/>
+                      <a:round/>
+                      <a:headEnd type="none" w="med" len="med"/>
+                      <a:tailEnd type="none" w="med" len="med"/>
+                    </a:lnB>
+                    <a:lnTlToBr w="12700" cmpd="sng">
+                      <a:noFill/>
+                      <a:prstDash val="solid"/>
+                    </a:lnTlToBr>
+                    <a:lnBlToTr w="12700" cmpd="sng">
+                      <a:noFill/>
+                      <a:prstDash val="solid"/>
+                    </a:lnBlToTr>
+                  </a:tcPr>
+                </a:tc>
+                <a:tc>
+                  <a:txBody>
+                    <a:bodyPr/>
+                    <a:lstStyle/>
+                    <a:p>
+                      <a:pPr algn="ctr"/>
+                      <a:r>
+                        <a:rPr lang="en-US" sz="1600" dirty="0">
+                          <a:latin typeface="Arial" panose="020B0604020202020204" pitchFamily="34" charset="0"/>
+                          <a:cs typeface="Arial" panose="020B0604020202020204" pitchFamily="34" charset="0"/>
+                        </a:rPr>
+                        <a:t>88.6%</a:t>
+                      </a:r>
+                    </a:p>
+                  </a:txBody>
+                  <a:tcPr anchor="ctr">
+                    <a:lnL w="12700" cap="flat" cmpd="sng" algn="ctr">
+                      <a:solidFill>
+                        <a:schemeClr val="tx1"/>
+                      </a:solidFill>
+                      <a:prstDash val="solid"/>
+                      <a:round/>
+                      <a:headEnd type="none" w="med" len="med"/>
+                      <a:tailEnd type="none" w="med" len="med"/>
+                    </a:lnL>
+                    <a:lnR w="12700" cap="flat" cmpd="sng" algn="ctr">
+                      <a:solidFill>
+                        <a:schemeClr val="tx1"/>
+                      </a:solidFill>
+                      <a:prstDash val="solid"/>
+                      <a:round/>
+                      <a:headEnd type="none" w="med" len="med"/>
+                      <a:tailEnd type="none" w="med" len="med"/>
+                    </a:lnR>
+                    <a:lnT w="12700" cap="flat" cmpd="sng" algn="ctr">
+                      <a:solidFill>
+                        <a:schemeClr val="tx1"/>
+                      </a:solidFill>
+                      <a:prstDash val="solid"/>
+                      <a:round/>
+                      <a:headEnd type="none" w="med" len="med"/>
+                      <a:tailEnd type="none" w="med" len="med"/>
+                    </a:lnT>
+                    <a:lnB w="12700" cap="flat" cmpd="sng" algn="ctr">
+                      <a:solidFill>
+                        <a:schemeClr val="tx1"/>
+                      </a:solidFill>
+                      <a:prstDash val="solid"/>
+                      <a:round/>
+                      <a:headEnd type="none" w="med" len="med"/>
+                      <a:tailEnd type="none" w="med" len="med"/>
+                    </a:lnB>
+                    <a:lnTlToBr w="12700" cmpd="sng">
+                      <a:noFill/>
+                      <a:prstDash val="solid"/>
+                    </a:lnTlToBr>
+                    <a:lnBlToTr w="12700" cmpd="sng">
+                      <a:noFill/>
+                      <a:prstDash val="solid"/>
+                    </a:lnBlToTr>
+                  </a:tcPr>
+                </a:tc>
+                <a:extLst>
+                  <a:ext uri="{0D108BD9-81ED-4DB2-BD59-A6C34878D82A}">
+                    <a16:rowId xmlns:a16="http://schemas.microsoft.com/office/drawing/2014/main" val="4114089788"/>
+                  </a:ext>
+                </a:extLst>
+              </a:tr>
+            </a:tbl>
+          </a:graphicData>
+        </a:graphic>
+      </p:graphicFrame>
+    </p:spTree>
+    <p:extLst>
+      <p:ext uri="{BB962C8B-B14F-4D97-AF65-F5344CB8AC3E}">
+        <p14:creationId xmlns:p14="http://schemas.microsoft.com/office/powerpoint/2010/main" val="3269341005"/>
+      </p:ext>
+    </p:extLst>
+  </p:cSld>
+  <p:clrMapOvr>
+    <a:masterClrMapping/>
+  </p:clrMapOvr>
+</p:sld>
+</file>
+
+<file path=ppt/slides/slide3.xml><?xml version="1.0" encoding="utf-8"?>
+<p:sld xmlns:a="http://schemas.openxmlformats.org/drawingml/2006/main" xmlns:r="http://schemas.openxmlformats.org/officeDocument/2006/relationships" xmlns:p="http://schemas.openxmlformats.org/presentationml/2006/main">
+  <p:cSld>
+    <p:spTree>
+      <p:nvGrpSpPr>
+        <p:cNvPr id="1" name=""/>
+        <p:cNvGrpSpPr/>
+        <p:nvPr/>
+      </p:nvGrpSpPr>
+      <p:grpSpPr>
+        <a:xfrm>
+          <a:off x="0" y="0"/>
+          <a:ext cx="0" cy="0"/>
+          <a:chOff x="0" y="0"/>
+          <a:chExt cx="0" cy="0"/>
+        </a:xfrm>
+      </p:grpSpPr>
+      <p:sp>
+        <p:nvSpPr>
+          <p:cNvPr id="4" name="Rectangle 3">
+            <a:extLst>
+              <a:ext uri="{FF2B5EF4-FFF2-40B4-BE49-F238E27FC236}">
+                <a16:creationId xmlns:a16="http://schemas.microsoft.com/office/drawing/2014/main" id="{714E4CCC-52A9-4F54-B749-30E35511B605}"/>
+              </a:ext>
+            </a:extLst>
+          </p:cNvPr>
+          <p:cNvSpPr/>
+          <p:nvPr/>
+        </p:nvSpPr>
+        <p:spPr>
+          <a:xfrm>
+            <a:off x="3904247" y="601579"/>
+            <a:ext cx="1221205" cy="216568"/>
+          </a:xfrm>
+          <a:prstGeom prst="rect">
+            <a:avLst/>
+          </a:prstGeom>
+          <a:solidFill>
+            <a:schemeClr val="tx1"/>
+          </a:solidFill>
+          <a:ln>
+            <a:solidFill>
+              <a:schemeClr val="tx1"/>
+            </a:solidFill>
+          </a:ln>
+        </p:spPr>
+        <p:style>
+          <a:lnRef idx="2">
+            <a:schemeClr val="accent1">
+              <a:shade val="50000"/>
+            </a:schemeClr>
+          </a:lnRef>
+          <a:fillRef idx="1">
+            <a:schemeClr val="accent1"/>
+          </a:fillRef>
+          <a:effectRef idx="0">
+            <a:schemeClr val="accent1"/>
+          </a:effectRef>
+          <a:fontRef idx="minor">
+            <a:schemeClr val="lt1"/>
+          </a:fontRef>
+        </p:style>
+        <p:txBody>
+          <a:bodyPr rtlCol="0" anchor="ctr"/>
+          <a:lstStyle/>
+          <a:p>
+            <a:pPr algn="ctr"/>
+            <a:r>
+              <a:rPr lang="en-US" dirty="0">
+                <a:latin typeface="Arial" panose="020B0604020202020204" pitchFamily="34" charset="0"/>
+                <a:cs typeface="Arial" panose="020B0604020202020204" pitchFamily="34" charset="0"/>
+              </a:rPr>
+              <a:t>+</a:t>
+            </a:r>
+          </a:p>
+        </p:txBody>
+      </p:sp>
+      <p:sp>
+        <p:nvSpPr>
+          <p:cNvPr id="5" name="Rectangle 4">
+            <a:extLst>
+              <a:ext uri="{FF2B5EF4-FFF2-40B4-BE49-F238E27FC236}">
+                <a16:creationId xmlns:a16="http://schemas.microsoft.com/office/drawing/2014/main" id="{1EDB7082-4EE7-4302-9DFD-42E8AB77EFE0}"/>
+              </a:ext>
+            </a:extLst>
+          </p:cNvPr>
+          <p:cNvSpPr/>
+          <p:nvPr/>
+        </p:nvSpPr>
+        <p:spPr>
+          <a:xfrm>
+            <a:off x="5193631" y="601579"/>
+            <a:ext cx="1221205" cy="216568"/>
+          </a:xfrm>
+          <a:prstGeom prst="rect">
+            <a:avLst/>
+          </a:prstGeom>
+          <a:solidFill>
+            <a:schemeClr val="tx1"/>
+          </a:solidFill>
+          <a:ln>
+            <a:solidFill>
+              <a:schemeClr val="tx1"/>
+            </a:solidFill>
+          </a:ln>
+        </p:spPr>
+        <p:style>
+          <a:lnRef idx="2">
+            <a:schemeClr val="accent1">
+              <a:shade val="50000"/>
+            </a:schemeClr>
+          </a:lnRef>
+          <a:fillRef idx="1">
+            <a:schemeClr val="accent1"/>
+          </a:fillRef>
+          <a:effectRef idx="0">
+            <a:schemeClr val="accent1"/>
+          </a:effectRef>
+          <a:fontRef idx="minor">
+            <a:schemeClr val="lt1"/>
+          </a:fontRef>
+        </p:style>
+        <p:txBody>
+          <a:bodyPr rtlCol="0" anchor="ctr"/>
+          <a:lstStyle/>
+          <a:p>
+            <a:pPr algn="ctr"/>
+            <a:r>
+              <a:rPr lang="en-US" dirty="0">
+                <a:latin typeface="Arial" panose="020B0604020202020204" pitchFamily="34" charset="0"/>
+                <a:cs typeface="Arial" panose="020B0604020202020204" pitchFamily="34" charset="0"/>
+              </a:rPr>
+              <a:t>-</a:t>
+            </a:r>
+          </a:p>
+        </p:txBody>
+      </p:sp>
+      <p:sp>
+        <p:nvSpPr>
+          <p:cNvPr id="6" name="Rectangle 5">
+            <a:extLst>
+              <a:ext uri="{FF2B5EF4-FFF2-40B4-BE49-F238E27FC236}">
+                <a16:creationId xmlns:a16="http://schemas.microsoft.com/office/drawing/2014/main" id="{721A4F66-F51B-4A6A-88A6-173A8BDC6AD5}"/>
+              </a:ext>
+            </a:extLst>
+          </p:cNvPr>
+          <p:cNvSpPr/>
+          <p:nvPr/>
+        </p:nvSpPr>
+        <p:spPr>
+          <a:xfrm rot="16200000">
+            <a:off x="3185360" y="1320465"/>
+            <a:ext cx="1221205" cy="216568"/>
+          </a:xfrm>
+          <a:prstGeom prst="rect">
+            <a:avLst/>
+          </a:prstGeom>
+          <a:solidFill>
+            <a:schemeClr val="tx1"/>
+          </a:solidFill>
+          <a:ln>
+            <a:solidFill>
+              <a:schemeClr val="tx1"/>
+            </a:solidFill>
+          </a:ln>
+        </p:spPr>
+        <p:style>
+          <a:lnRef idx="2">
+            <a:schemeClr val="accent1">
+              <a:shade val="50000"/>
+            </a:schemeClr>
+          </a:lnRef>
+          <a:fillRef idx="1">
+            <a:schemeClr val="accent1"/>
+          </a:fillRef>
+          <a:effectRef idx="0">
+            <a:schemeClr val="accent1"/>
+          </a:effectRef>
+          <a:fontRef idx="minor">
+            <a:schemeClr val="lt1"/>
+          </a:fontRef>
+        </p:style>
+        <p:txBody>
+          <a:bodyPr rtlCol="0" anchor="ctr"/>
+          <a:lstStyle/>
+          <a:p>
+            <a:pPr algn="ctr"/>
+            <a:r>
+              <a:rPr lang="en-US" dirty="0">
+                <a:latin typeface="Arial" panose="020B0604020202020204" pitchFamily="34" charset="0"/>
+                <a:cs typeface="Arial" panose="020B0604020202020204" pitchFamily="34" charset="0"/>
+              </a:rPr>
+              <a:t>+</a:t>
+            </a:r>
+          </a:p>
+        </p:txBody>
+      </p:sp>
+      <p:sp>
+        <p:nvSpPr>
+          <p:cNvPr id="7" name="Rectangle 6">
+            <a:extLst>
+              <a:ext uri="{FF2B5EF4-FFF2-40B4-BE49-F238E27FC236}">
+                <a16:creationId xmlns:a16="http://schemas.microsoft.com/office/drawing/2014/main" id="{4BB274B6-7C56-4272-8664-7434EC363E7A}"/>
+              </a:ext>
+            </a:extLst>
+          </p:cNvPr>
+          <p:cNvSpPr/>
+          <p:nvPr/>
+        </p:nvSpPr>
+        <p:spPr>
+          <a:xfrm rot="16200000">
+            <a:off x="3185360" y="2606841"/>
+            <a:ext cx="1221205" cy="216568"/>
+          </a:xfrm>
+          <a:prstGeom prst="rect">
+            <a:avLst/>
+          </a:prstGeom>
+          <a:solidFill>
+            <a:schemeClr val="tx1"/>
+          </a:solidFill>
+          <a:ln>
+            <a:solidFill>
+              <a:schemeClr val="tx1"/>
+            </a:solidFill>
+          </a:ln>
+        </p:spPr>
+        <p:style>
+          <a:lnRef idx="2">
+            <a:schemeClr val="accent1">
+              <a:shade val="50000"/>
+            </a:schemeClr>
+          </a:lnRef>
+          <a:fillRef idx="1">
+            <a:schemeClr val="accent1"/>
+          </a:fillRef>
+          <a:effectRef idx="0">
+            <a:schemeClr val="accent1"/>
+          </a:effectRef>
+          <a:fontRef idx="minor">
+            <a:schemeClr val="lt1"/>
+          </a:fontRef>
+        </p:style>
+        <p:txBody>
+          <a:bodyPr rtlCol="0" anchor="ctr"/>
+          <a:lstStyle/>
+          <a:p>
+            <a:pPr algn="ctr"/>
+            <a:r>
+              <a:rPr lang="en-US" dirty="0">
+                <a:latin typeface="Arial" panose="020B0604020202020204" pitchFamily="34" charset="0"/>
+                <a:cs typeface="Arial" panose="020B0604020202020204" pitchFamily="34" charset="0"/>
+              </a:rPr>
+              <a:t>-</a:t>
+            </a:r>
+          </a:p>
+        </p:txBody>
+      </p:sp>
+      <p:sp>
+        <p:nvSpPr>
+          <p:cNvPr id="8" name="Rectangle 7">
+            <a:extLst>
+              <a:ext uri="{FF2B5EF4-FFF2-40B4-BE49-F238E27FC236}">
+                <a16:creationId xmlns:a16="http://schemas.microsoft.com/office/drawing/2014/main" id="{C5960104-E760-4641-974D-1C4F3449AB95}"/>
+              </a:ext>
+            </a:extLst>
+          </p:cNvPr>
+          <p:cNvSpPr/>
+          <p:nvPr/>
+        </p:nvSpPr>
+        <p:spPr>
+          <a:xfrm>
+            <a:off x="3904247" y="385011"/>
+            <a:ext cx="2510590" cy="216568"/>
+          </a:xfrm>
+          <a:prstGeom prst="rect">
+            <a:avLst/>
+          </a:prstGeom>
+          <a:solidFill>
+            <a:schemeClr val="tx1">
+              <a:lumMod val="65000"/>
+              <a:lumOff val="35000"/>
+            </a:schemeClr>
+          </a:solidFill>
+          <a:ln>
+            <a:solidFill>
+              <a:schemeClr val="tx1"/>
+            </a:solidFill>
+          </a:ln>
+        </p:spPr>
+        <p:style>
+          <a:lnRef idx="2">
+            <a:schemeClr val="accent1">
+              <a:shade val="50000"/>
+            </a:schemeClr>
+          </a:lnRef>
+          <a:fillRef idx="1">
+            <a:schemeClr val="accent1"/>
+          </a:fillRef>
+          <a:effectRef idx="0">
+            <a:schemeClr val="accent1"/>
+          </a:effectRef>
+          <a:fontRef idx="minor">
+            <a:schemeClr val="lt1"/>
+          </a:fontRef>
+        </p:style>
+        <p:txBody>
+          <a:bodyPr rtlCol="0" anchor="ctr"/>
+          <a:lstStyle/>
+          <a:p>
+            <a:pPr algn="ctr"/>
+            <a:r>
+              <a:rPr lang="en-US" sz="1600" dirty="0">
+                <a:latin typeface="Arial" panose="020B0604020202020204" pitchFamily="34" charset="0"/>
+                <a:cs typeface="Arial" panose="020B0604020202020204" pitchFamily="34" charset="0"/>
+              </a:rPr>
+              <a:t>qPCR Result</a:t>
+            </a:r>
+          </a:p>
+        </p:txBody>
+      </p:sp>
+      <p:sp>
+        <p:nvSpPr>
+          <p:cNvPr id="9" name="Rectangle 8">
+            <a:extLst>
+              <a:ext uri="{FF2B5EF4-FFF2-40B4-BE49-F238E27FC236}">
+                <a16:creationId xmlns:a16="http://schemas.microsoft.com/office/drawing/2014/main" id="{67D70D3B-A7B5-4B74-99F7-3539135A1C56}"/>
+              </a:ext>
+            </a:extLst>
+          </p:cNvPr>
+          <p:cNvSpPr/>
+          <p:nvPr/>
+        </p:nvSpPr>
+        <p:spPr>
+          <a:xfrm rot="16200000">
+            <a:off x="2324099" y="1965157"/>
+            <a:ext cx="2510590" cy="216568"/>
+          </a:xfrm>
+          <a:prstGeom prst="rect">
+            <a:avLst/>
+          </a:prstGeom>
+          <a:solidFill>
+            <a:schemeClr val="tx1">
+              <a:lumMod val="65000"/>
+              <a:lumOff val="35000"/>
+            </a:schemeClr>
+          </a:solidFill>
+          <a:ln>
+            <a:solidFill>
+              <a:schemeClr val="tx1"/>
+            </a:solidFill>
+          </a:ln>
+        </p:spPr>
+        <p:style>
+          <a:lnRef idx="2">
+            <a:schemeClr val="accent1">
+              <a:shade val="50000"/>
+            </a:schemeClr>
+          </a:lnRef>
+          <a:fillRef idx="1">
+            <a:schemeClr val="accent1"/>
+          </a:fillRef>
+          <a:effectRef idx="0">
+            <a:schemeClr val="accent1"/>
+          </a:effectRef>
+          <a:fontRef idx="minor">
+            <a:schemeClr val="lt1"/>
+          </a:fontRef>
+        </p:style>
+        <p:txBody>
+          <a:bodyPr rtlCol="0" anchor="ctr"/>
+          <a:lstStyle/>
+          <a:p>
+            <a:pPr algn="ctr"/>
+            <a:r>
+              <a:rPr lang="en-US" sz="1600" dirty="0">
+                <a:latin typeface="Arial" panose="020B0604020202020204" pitchFamily="34" charset="0"/>
+                <a:cs typeface="Arial" panose="020B0604020202020204" pitchFamily="34" charset="0"/>
+              </a:rPr>
+              <a:t>RDT Result</a:t>
+            </a:r>
+          </a:p>
+        </p:txBody>
+      </p:sp>
+      <p:sp>
+        <p:nvSpPr>
+          <p:cNvPr id="11" name="Rectangle 10">
+            <a:extLst>
+              <a:ext uri="{FF2B5EF4-FFF2-40B4-BE49-F238E27FC236}">
+                <a16:creationId xmlns:a16="http://schemas.microsoft.com/office/drawing/2014/main" id="{41AB67C9-E603-4D22-B068-6108F3010A7E}"/>
+              </a:ext>
+            </a:extLst>
+          </p:cNvPr>
+          <p:cNvSpPr/>
+          <p:nvPr/>
+        </p:nvSpPr>
+        <p:spPr>
+          <a:xfrm>
+            <a:off x="5193630" y="2104522"/>
+            <a:ext cx="1221205" cy="1221207"/>
+          </a:xfrm>
+          <a:prstGeom prst="rect">
+            <a:avLst/>
+          </a:prstGeom>
+          <a:noFill/>
+          <a:ln>
+            <a:solidFill>
+              <a:schemeClr val="tx1"/>
+            </a:solidFill>
+          </a:ln>
+        </p:spPr>
+        <p:style>
+          <a:lnRef idx="2">
+            <a:schemeClr val="accent1">
+              <a:shade val="50000"/>
+            </a:schemeClr>
+          </a:lnRef>
+          <a:fillRef idx="1">
+            <a:schemeClr val="accent1"/>
+          </a:fillRef>
+          <a:effectRef idx="0">
+            <a:schemeClr val="accent1"/>
+          </a:effectRef>
+          <a:fontRef idx="minor">
+            <a:schemeClr val="lt1"/>
+          </a:fontRef>
+        </p:style>
+        <p:txBody>
+          <a:bodyPr rtlCol="0" anchor="ctr"/>
+          <a:lstStyle/>
+          <a:p>
+            <a:pPr algn="ctr"/>
+            <a:r>
+              <a:rPr lang="en-US" sz="1600" dirty="0">
+                <a:solidFill>
+                  <a:schemeClr val="tx1"/>
+                </a:solidFill>
+                <a:latin typeface="Arial" panose="020B0604020202020204" pitchFamily="34" charset="0"/>
+                <a:cs typeface="Arial" panose="020B0604020202020204" pitchFamily="34" charset="0"/>
+              </a:rPr>
+              <a:t>22</a:t>
+            </a:r>
+          </a:p>
+          <a:p>
+            <a:pPr algn="ctr"/>
+            <a:r>
+              <a:rPr lang="en-US" sz="1100" dirty="0">
+                <a:solidFill>
+                  <a:schemeClr val="tx1"/>
+                </a:solidFill>
+                <a:latin typeface="Arial" panose="020B0604020202020204" pitchFamily="34" charset="0"/>
+                <a:cs typeface="Arial" panose="020B0604020202020204" pitchFamily="34" charset="0"/>
+              </a:rPr>
+              <a:t>True Negatives</a:t>
+            </a:r>
+          </a:p>
+        </p:txBody>
+      </p:sp>
+      <p:sp>
+        <p:nvSpPr>
+          <p:cNvPr id="12" name="Rectangle 11">
+            <a:extLst>
+              <a:ext uri="{FF2B5EF4-FFF2-40B4-BE49-F238E27FC236}">
+                <a16:creationId xmlns:a16="http://schemas.microsoft.com/office/drawing/2014/main" id="{D51D2A7B-780E-4650-855A-7DECFC4B7567}"/>
+              </a:ext>
+            </a:extLst>
+          </p:cNvPr>
+          <p:cNvSpPr/>
+          <p:nvPr/>
+        </p:nvSpPr>
+        <p:spPr>
+          <a:xfrm>
+            <a:off x="3471108" y="385011"/>
+            <a:ext cx="3725135" cy="3717755"/>
+          </a:xfrm>
+          <a:prstGeom prst="rect">
+            <a:avLst/>
+          </a:prstGeom>
+          <a:noFill/>
+          <a:ln>
+            <a:solidFill>
+              <a:schemeClr val="tx1"/>
+            </a:solidFill>
+          </a:ln>
+        </p:spPr>
+        <p:style>
+          <a:lnRef idx="2">
+            <a:schemeClr val="accent1">
+              <a:shade val="50000"/>
+            </a:schemeClr>
+          </a:lnRef>
+          <a:fillRef idx="1">
+            <a:schemeClr val="accent1"/>
+          </a:fillRef>
+          <a:effectRef idx="0">
+            <a:schemeClr val="accent1"/>
+          </a:effectRef>
+          <a:fontRef idx="minor">
+            <a:schemeClr val="lt1"/>
+          </a:fontRef>
+        </p:style>
+        <p:txBody>
+          <a:bodyPr rtlCol="0" anchor="ctr"/>
+          <a:lstStyle/>
+          <a:p>
+            <a:pPr algn="ctr"/>
+            <a:endParaRPr lang="en-US" sz="1100" dirty="0">
+              <a:solidFill>
+                <a:schemeClr val="tx1"/>
+              </a:solidFill>
+              <a:latin typeface="Arial" panose="020B0604020202020204" pitchFamily="34" charset="0"/>
+              <a:cs typeface="Arial" panose="020B0604020202020204" pitchFamily="34" charset="0"/>
+            </a:endParaRPr>
+          </a:p>
+        </p:txBody>
+      </p:sp>
+      <p:sp>
+        <p:nvSpPr>
+          <p:cNvPr id="13" name="Rectangle 12">
+            <a:extLst>
+              <a:ext uri="{FF2B5EF4-FFF2-40B4-BE49-F238E27FC236}">
+                <a16:creationId xmlns:a16="http://schemas.microsoft.com/office/drawing/2014/main" id="{2484FC27-EBBE-44D0-8B09-970D647A4B36}"/>
+              </a:ext>
+            </a:extLst>
+          </p:cNvPr>
+          <p:cNvSpPr/>
+          <p:nvPr/>
+        </p:nvSpPr>
+        <p:spPr>
+          <a:xfrm>
+            <a:off x="3904247" y="818146"/>
+            <a:ext cx="1221205" cy="1221206"/>
+          </a:xfrm>
+          <a:prstGeom prst="rect">
+            <a:avLst/>
+          </a:prstGeom>
+          <a:noFill/>
+          <a:ln>
+            <a:solidFill>
+              <a:schemeClr val="tx1"/>
+            </a:solidFill>
+          </a:ln>
+        </p:spPr>
+        <p:style>
+          <a:lnRef idx="2">
+            <a:schemeClr val="accent1">
+              <a:shade val="50000"/>
+            </a:schemeClr>
+          </a:lnRef>
+          <a:fillRef idx="1">
+            <a:schemeClr val="accent1"/>
+          </a:fillRef>
+          <a:effectRef idx="0">
+            <a:schemeClr val="accent1"/>
+          </a:effectRef>
+          <a:fontRef idx="minor">
+            <a:schemeClr val="lt1"/>
+          </a:fontRef>
+        </p:style>
+        <p:txBody>
+          <a:bodyPr rtlCol="0" anchor="ctr"/>
+          <a:lstStyle/>
+          <a:p>
+            <a:pPr algn="ctr"/>
+            <a:r>
+              <a:rPr lang="en-US" sz="1600" dirty="0">
+                <a:solidFill>
+                  <a:schemeClr val="tx1"/>
+                </a:solidFill>
+                <a:latin typeface="Arial" panose="020B0604020202020204" pitchFamily="34" charset="0"/>
+                <a:cs typeface="Arial" panose="020B0604020202020204" pitchFamily="34" charset="0"/>
+              </a:rPr>
+              <a:t>62</a:t>
+            </a:r>
+          </a:p>
+          <a:p>
+            <a:pPr algn="ctr"/>
+            <a:r>
+              <a:rPr lang="en-US" sz="1100" dirty="0">
+                <a:solidFill>
+                  <a:schemeClr val="tx1"/>
+                </a:solidFill>
+                <a:latin typeface="Arial" panose="020B0604020202020204" pitchFamily="34" charset="0"/>
+                <a:cs typeface="Arial" panose="020B0604020202020204" pitchFamily="34" charset="0"/>
+              </a:rPr>
+              <a:t>True Positives</a:t>
+            </a:r>
+          </a:p>
+        </p:txBody>
+      </p:sp>
+      <p:sp>
+        <p:nvSpPr>
+          <p:cNvPr id="14" name="Rectangle 13">
+            <a:extLst>
+              <a:ext uri="{FF2B5EF4-FFF2-40B4-BE49-F238E27FC236}">
+                <a16:creationId xmlns:a16="http://schemas.microsoft.com/office/drawing/2014/main" id="{8EECAE8D-0E9D-4F9A-A6A8-35C1F2025ECA}"/>
+              </a:ext>
+            </a:extLst>
+          </p:cNvPr>
+          <p:cNvSpPr/>
+          <p:nvPr/>
+        </p:nvSpPr>
+        <p:spPr>
+          <a:xfrm>
+            <a:off x="5193629" y="818146"/>
+            <a:ext cx="1221205" cy="1221206"/>
+          </a:xfrm>
+          <a:prstGeom prst="rect">
+            <a:avLst/>
+          </a:prstGeom>
+          <a:noFill/>
+          <a:ln>
+            <a:solidFill>
+              <a:schemeClr val="tx1"/>
+            </a:solidFill>
+          </a:ln>
+        </p:spPr>
+        <p:style>
+          <a:lnRef idx="2">
+            <a:schemeClr val="accent1">
+              <a:shade val="50000"/>
+            </a:schemeClr>
+          </a:lnRef>
+          <a:fillRef idx="1">
+            <a:schemeClr val="accent1"/>
+          </a:fillRef>
+          <a:effectRef idx="0">
+            <a:schemeClr val="accent1"/>
+          </a:effectRef>
+          <a:fontRef idx="minor">
+            <a:schemeClr val="lt1"/>
+          </a:fontRef>
+        </p:style>
+        <p:txBody>
+          <a:bodyPr rtlCol="0" anchor="ctr"/>
+          <a:lstStyle/>
+          <a:p>
+            <a:pPr algn="ctr"/>
+            <a:r>
+              <a:rPr lang="en-US" sz="1600" dirty="0">
+                <a:solidFill>
+                  <a:schemeClr val="tx1"/>
+                </a:solidFill>
+                <a:latin typeface="Arial" panose="020B0604020202020204" pitchFamily="34" charset="0"/>
+                <a:cs typeface="Arial" panose="020B0604020202020204" pitchFamily="34" charset="0"/>
+              </a:rPr>
+              <a:t>4</a:t>
+            </a:r>
+          </a:p>
+          <a:p>
+            <a:pPr algn="ctr"/>
+            <a:r>
+              <a:rPr lang="en-US" sz="1100" dirty="0">
+                <a:solidFill>
+                  <a:schemeClr val="tx1"/>
+                </a:solidFill>
+                <a:latin typeface="Arial" panose="020B0604020202020204" pitchFamily="34" charset="0"/>
+                <a:cs typeface="Arial" panose="020B0604020202020204" pitchFamily="34" charset="0"/>
+              </a:rPr>
+              <a:t>False Positives</a:t>
+            </a:r>
+          </a:p>
+        </p:txBody>
+      </p:sp>
+      <p:sp>
+        <p:nvSpPr>
+          <p:cNvPr id="15" name="Rectangle 14">
+            <a:extLst>
+              <a:ext uri="{FF2B5EF4-FFF2-40B4-BE49-F238E27FC236}">
+                <a16:creationId xmlns:a16="http://schemas.microsoft.com/office/drawing/2014/main" id="{2F668DF0-CB88-4B2F-9456-247ACD786A64}"/>
+              </a:ext>
+            </a:extLst>
+          </p:cNvPr>
+          <p:cNvSpPr/>
+          <p:nvPr/>
+        </p:nvSpPr>
+        <p:spPr>
+          <a:xfrm>
+            <a:off x="3904246" y="2104522"/>
+            <a:ext cx="1221205" cy="1221206"/>
+          </a:xfrm>
+          <a:prstGeom prst="rect">
+            <a:avLst/>
+          </a:prstGeom>
+          <a:noFill/>
+          <a:ln>
+            <a:solidFill>
+              <a:schemeClr val="tx1"/>
+            </a:solidFill>
+          </a:ln>
+        </p:spPr>
+        <p:style>
+          <a:lnRef idx="2">
+            <a:schemeClr val="accent1">
+              <a:shade val="50000"/>
+            </a:schemeClr>
+          </a:lnRef>
+          <a:fillRef idx="1">
+            <a:schemeClr val="accent1"/>
+          </a:fillRef>
+          <a:effectRef idx="0">
+            <a:schemeClr val="accent1"/>
+          </a:effectRef>
+          <a:fontRef idx="minor">
+            <a:schemeClr val="lt1"/>
+          </a:fontRef>
+        </p:style>
+        <p:txBody>
+          <a:bodyPr rtlCol="0" anchor="ctr"/>
+          <a:lstStyle/>
+          <a:p>
+            <a:pPr algn="ctr"/>
+            <a:r>
+              <a:rPr lang="en-US" sz="1600" dirty="0">
+                <a:solidFill>
+                  <a:schemeClr val="tx1"/>
+                </a:solidFill>
+                <a:latin typeface="Arial" panose="020B0604020202020204" pitchFamily="34" charset="0"/>
+                <a:cs typeface="Arial" panose="020B0604020202020204" pitchFamily="34" charset="0"/>
+              </a:rPr>
+              <a:t>12</a:t>
+            </a:r>
+          </a:p>
+          <a:p>
+            <a:pPr algn="ctr"/>
+            <a:r>
+              <a:rPr lang="en-US" sz="1100" dirty="0">
+                <a:solidFill>
+                  <a:schemeClr val="tx1"/>
+                </a:solidFill>
+                <a:latin typeface="Arial" panose="020B0604020202020204" pitchFamily="34" charset="0"/>
+                <a:cs typeface="Arial" panose="020B0604020202020204" pitchFamily="34" charset="0"/>
+              </a:rPr>
+              <a:t>False Negatives</a:t>
+            </a:r>
+          </a:p>
+        </p:txBody>
+      </p:sp>
+      <p:sp>
+        <p:nvSpPr>
+          <p:cNvPr id="16" name="Rectangle 15">
+            <a:extLst>
+              <a:ext uri="{FF2B5EF4-FFF2-40B4-BE49-F238E27FC236}">
+                <a16:creationId xmlns:a16="http://schemas.microsoft.com/office/drawing/2014/main" id="{ACF9F314-44A0-4C3A-9E39-031397BB29F1}"/>
+              </a:ext>
+            </a:extLst>
+          </p:cNvPr>
+          <p:cNvSpPr/>
+          <p:nvPr/>
+        </p:nvSpPr>
+        <p:spPr>
+          <a:xfrm>
+            <a:off x="6483011" y="818146"/>
+            <a:ext cx="713232" cy="1221206"/>
+          </a:xfrm>
+          <a:prstGeom prst="rect">
+            <a:avLst/>
+          </a:prstGeom>
+          <a:noFill/>
+          <a:ln>
+            <a:solidFill>
+              <a:schemeClr val="tx1"/>
+            </a:solidFill>
+          </a:ln>
+        </p:spPr>
+        <p:style>
+          <a:lnRef idx="2">
+            <a:schemeClr val="accent1">
+              <a:shade val="50000"/>
+            </a:schemeClr>
+          </a:lnRef>
+          <a:fillRef idx="1">
+            <a:schemeClr val="accent1"/>
+          </a:fillRef>
+          <a:effectRef idx="0">
+            <a:schemeClr val="accent1"/>
+          </a:effectRef>
+          <a:fontRef idx="minor">
+            <a:schemeClr val="lt1"/>
+          </a:fontRef>
+        </p:style>
+        <p:txBody>
+          <a:bodyPr rtlCol="0" anchor="ctr"/>
+          <a:lstStyle/>
+          <a:p>
+            <a:pPr algn="ctr"/>
+            <a:r>
+              <a:rPr lang="en-US" sz="1600" dirty="0">
+                <a:solidFill>
+                  <a:schemeClr val="tx1"/>
+                </a:solidFill>
+                <a:latin typeface="Arial" panose="020B0604020202020204" pitchFamily="34" charset="0"/>
+                <a:cs typeface="Arial" panose="020B0604020202020204" pitchFamily="34" charset="0"/>
+              </a:rPr>
+              <a:t>66</a:t>
+            </a:r>
+          </a:p>
+          <a:p>
+            <a:pPr algn="ctr"/>
+            <a:r>
+              <a:rPr lang="en-US" sz="900" dirty="0">
+                <a:solidFill>
+                  <a:schemeClr val="tx1"/>
+                </a:solidFill>
+                <a:latin typeface="Arial" panose="020B0604020202020204" pitchFamily="34" charset="0"/>
+                <a:cs typeface="Arial" panose="020B0604020202020204" pitchFamily="34" charset="0"/>
+              </a:rPr>
+              <a:t>Total RDT Positives</a:t>
+            </a:r>
+          </a:p>
+        </p:txBody>
+      </p:sp>
+      <p:sp>
+        <p:nvSpPr>
+          <p:cNvPr id="17" name="Rectangle 16">
+            <a:extLst>
+              <a:ext uri="{FF2B5EF4-FFF2-40B4-BE49-F238E27FC236}">
+                <a16:creationId xmlns:a16="http://schemas.microsoft.com/office/drawing/2014/main" id="{A6909579-C98E-4736-A643-3DDDEAFBD9F3}"/>
+              </a:ext>
+            </a:extLst>
+          </p:cNvPr>
+          <p:cNvSpPr/>
+          <p:nvPr/>
+        </p:nvSpPr>
+        <p:spPr>
+          <a:xfrm>
+            <a:off x="6483011" y="2104522"/>
+            <a:ext cx="713232" cy="1221206"/>
+          </a:xfrm>
+          <a:prstGeom prst="rect">
+            <a:avLst/>
+          </a:prstGeom>
+          <a:noFill/>
+          <a:ln>
+            <a:solidFill>
+              <a:schemeClr val="tx1"/>
+            </a:solidFill>
+          </a:ln>
+        </p:spPr>
+        <p:style>
+          <a:lnRef idx="2">
+            <a:schemeClr val="accent1">
+              <a:shade val="50000"/>
+            </a:schemeClr>
+          </a:lnRef>
+          <a:fillRef idx="1">
+            <a:schemeClr val="accent1"/>
+          </a:fillRef>
+          <a:effectRef idx="0">
+            <a:schemeClr val="accent1"/>
+          </a:effectRef>
+          <a:fontRef idx="minor">
+            <a:schemeClr val="lt1"/>
+          </a:fontRef>
+        </p:style>
+        <p:txBody>
+          <a:bodyPr rtlCol="0" anchor="ctr"/>
+          <a:lstStyle/>
+          <a:p>
+            <a:pPr algn="ctr"/>
+            <a:r>
+              <a:rPr lang="en-US" sz="1600" dirty="0">
+                <a:solidFill>
+                  <a:schemeClr val="tx1"/>
+                </a:solidFill>
+                <a:latin typeface="Arial" panose="020B0604020202020204" pitchFamily="34" charset="0"/>
+                <a:cs typeface="Arial" panose="020B0604020202020204" pitchFamily="34" charset="0"/>
+              </a:rPr>
+              <a:t>34</a:t>
+            </a:r>
+          </a:p>
+          <a:p>
+            <a:pPr algn="ctr"/>
+            <a:r>
+              <a:rPr lang="en-US" sz="900" dirty="0">
+                <a:solidFill>
+                  <a:schemeClr val="tx1"/>
+                </a:solidFill>
+                <a:latin typeface="Arial" panose="020B0604020202020204" pitchFamily="34" charset="0"/>
+                <a:cs typeface="Arial" panose="020B0604020202020204" pitchFamily="34" charset="0"/>
+              </a:rPr>
+              <a:t>Total RDT Negatives</a:t>
+            </a:r>
+          </a:p>
+        </p:txBody>
+      </p:sp>
+      <p:sp>
+        <p:nvSpPr>
+          <p:cNvPr id="18" name="Rectangle 17">
+            <a:extLst>
+              <a:ext uri="{FF2B5EF4-FFF2-40B4-BE49-F238E27FC236}">
+                <a16:creationId xmlns:a16="http://schemas.microsoft.com/office/drawing/2014/main" id="{5EC58040-AE3D-4E0A-BC0A-4E3A506E0DA2}"/>
+              </a:ext>
+            </a:extLst>
+          </p:cNvPr>
+          <p:cNvSpPr/>
+          <p:nvPr/>
+        </p:nvSpPr>
+        <p:spPr>
+          <a:xfrm>
+            <a:off x="6483011" y="3390898"/>
+            <a:ext cx="713232" cy="711870"/>
+          </a:xfrm>
+          <a:prstGeom prst="rect">
+            <a:avLst/>
+          </a:prstGeom>
+          <a:noFill/>
+          <a:ln>
+            <a:solidFill>
+              <a:schemeClr val="tx1"/>
+            </a:solidFill>
+          </a:ln>
+        </p:spPr>
+        <p:style>
+          <a:lnRef idx="2">
+            <a:schemeClr val="accent1">
+              <a:shade val="50000"/>
+            </a:schemeClr>
+          </a:lnRef>
+          <a:fillRef idx="1">
+            <a:schemeClr val="accent1"/>
+          </a:fillRef>
+          <a:effectRef idx="0">
+            <a:schemeClr val="accent1"/>
+          </a:effectRef>
+          <a:fontRef idx="minor">
+            <a:schemeClr val="lt1"/>
+          </a:fontRef>
+        </p:style>
+        <p:txBody>
+          <a:bodyPr rtlCol="0" anchor="ctr"/>
+          <a:lstStyle/>
+          <a:p>
+            <a:pPr algn="ctr"/>
+            <a:r>
+              <a:rPr lang="en-US" sz="1600" dirty="0">
+                <a:solidFill>
+                  <a:schemeClr val="tx1"/>
+                </a:solidFill>
+                <a:latin typeface="Arial" panose="020B0604020202020204" pitchFamily="34" charset="0"/>
+                <a:cs typeface="Arial" panose="020B0604020202020204" pitchFamily="34" charset="0"/>
+              </a:rPr>
+              <a:t>100</a:t>
+            </a:r>
+          </a:p>
+          <a:p>
+            <a:pPr algn="ctr"/>
+            <a:r>
+              <a:rPr lang="en-US" sz="700" dirty="0">
+                <a:solidFill>
+                  <a:schemeClr val="tx1"/>
+                </a:solidFill>
+                <a:latin typeface="Arial" panose="020B0604020202020204" pitchFamily="34" charset="0"/>
+                <a:cs typeface="Arial" panose="020B0604020202020204" pitchFamily="34" charset="0"/>
+              </a:rPr>
+              <a:t>Total Conclusive RDT Results</a:t>
+            </a:r>
+          </a:p>
+        </p:txBody>
+      </p:sp>
+      <p:sp>
+        <p:nvSpPr>
+          <p:cNvPr id="19" name="Rectangle 18">
+            <a:extLst>
+              <a:ext uri="{FF2B5EF4-FFF2-40B4-BE49-F238E27FC236}">
+                <a16:creationId xmlns:a16="http://schemas.microsoft.com/office/drawing/2014/main" id="{C6C39675-269A-4ED3-97BD-05E4CCF46B52}"/>
+              </a:ext>
+            </a:extLst>
+          </p:cNvPr>
+          <p:cNvSpPr/>
+          <p:nvPr/>
+        </p:nvSpPr>
+        <p:spPr>
+          <a:xfrm>
+            <a:off x="3904245" y="3390898"/>
+            <a:ext cx="1221205" cy="711870"/>
+          </a:xfrm>
+          <a:prstGeom prst="rect">
+            <a:avLst/>
+          </a:prstGeom>
+          <a:noFill/>
+          <a:ln>
+            <a:solidFill>
+              <a:schemeClr val="tx1"/>
+            </a:solidFill>
+          </a:ln>
+        </p:spPr>
+        <p:style>
+          <a:lnRef idx="2">
+            <a:schemeClr val="accent1">
+              <a:shade val="50000"/>
+            </a:schemeClr>
+          </a:lnRef>
+          <a:fillRef idx="1">
+            <a:schemeClr val="accent1"/>
+          </a:fillRef>
+          <a:effectRef idx="0">
+            <a:schemeClr val="accent1"/>
+          </a:effectRef>
+          <a:fontRef idx="minor">
+            <a:schemeClr val="lt1"/>
+          </a:fontRef>
+        </p:style>
+        <p:txBody>
+          <a:bodyPr rtlCol="0" anchor="ctr"/>
+          <a:lstStyle/>
+          <a:p>
+            <a:pPr algn="ctr"/>
+            <a:r>
+              <a:rPr lang="en-US" sz="1600" dirty="0">
+                <a:solidFill>
+                  <a:schemeClr val="tx1"/>
+                </a:solidFill>
+                <a:latin typeface="Arial" panose="020B0604020202020204" pitchFamily="34" charset="0"/>
+                <a:cs typeface="Arial" panose="020B0604020202020204" pitchFamily="34" charset="0"/>
+              </a:rPr>
+              <a:t>74</a:t>
+            </a:r>
+          </a:p>
+          <a:p>
+            <a:pPr algn="ctr"/>
+            <a:r>
+              <a:rPr lang="en-US" sz="900" dirty="0">
+                <a:solidFill>
+                  <a:schemeClr val="tx1"/>
+                </a:solidFill>
+                <a:latin typeface="Arial" panose="020B0604020202020204" pitchFamily="34" charset="0"/>
+                <a:cs typeface="Arial" panose="020B0604020202020204" pitchFamily="34" charset="0"/>
+              </a:rPr>
+              <a:t>Total qPCR Positives</a:t>
+            </a:r>
+          </a:p>
+        </p:txBody>
+      </p:sp>
+      <p:sp>
+        <p:nvSpPr>
+          <p:cNvPr id="20" name="Rectangle 19">
+            <a:extLst>
+              <a:ext uri="{FF2B5EF4-FFF2-40B4-BE49-F238E27FC236}">
+                <a16:creationId xmlns:a16="http://schemas.microsoft.com/office/drawing/2014/main" id="{52374CBE-0E9F-4934-9499-C1E7632E861C}"/>
+              </a:ext>
+            </a:extLst>
+          </p:cNvPr>
+          <p:cNvSpPr/>
+          <p:nvPr/>
+        </p:nvSpPr>
+        <p:spPr>
+          <a:xfrm>
+            <a:off x="5193627" y="3390897"/>
+            <a:ext cx="1221205" cy="711870"/>
+          </a:xfrm>
+          <a:prstGeom prst="rect">
+            <a:avLst/>
+          </a:prstGeom>
+          <a:noFill/>
+          <a:ln>
+            <a:solidFill>
+              <a:schemeClr val="tx1"/>
+            </a:solidFill>
+          </a:ln>
+        </p:spPr>
+        <p:style>
+          <a:lnRef idx="2">
+            <a:schemeClr val="accent1">
+              <a:shade val="50000"/>
+            </a:schemeClr>
+          </a:lnRef>
+          <a:fillRef idx="1">
+            <a:schemeClr val="accent1"/>
+          </a:fillRef>
+          <a:effectRef idx="0">
+            <a:schemeClr val="accent1"/>
+          </a:effectRef>
+          <a:fontRef idx="minor">
+            <a:schemeClr val="lt1"/>
+          </a:fontRef>
+        </p:style>
+        <p:txBody>
+          <a:bodyPr rtlCol="0" anchor="ctr"/>
+          <a:lstStyle/>
+          <a:p>
+            <a:pPr algn="ctr"/>
+            <a:r>
+              <a:rPr lang="en-US" sz="1600" dirty="0">
+                <a:solidFill>
+                  <a:schemeClr val="tx1"/>
+                </a:solidFill>
+                <a:latin typeface="Arial" panose="020B0604020202020204" pitchFamily="34" charset="0"/>
+                <a:cs typeface="Arial" panose="020B0604020202020204" pitchFamily="34" charset="0"/>
+              </a:rPr>
+              <a:t>26</a:t>
+            </a:r>
+          </a:p>
+          <a:p>
+            <a:pPr algn="ctr"/>
+            <a:r>
+              <a:rPr lang="en-US" sz="900" dirty="0">
+                <a:solidFill>
+                  <a:schemeClr val="tx1"/>
+                </a:solidFill>
+                <a:latin typeface="Arial" panose="020B0604020202020204" pitchFamily="34" charset="0"/>
+                <a:cs typeface="Arial" panose="020B0604020202020204" pitchFamily="34" charset="0"/>
+              </a:rPr>
+              <a:t>Total qPCR Negatives</a:t>
+            </a:r>
+          </a:p>
+        </p:txBody>
+      </p:sp>
+      <p:sp>
+        <p:nvSpPr>
+          <p:cNvPr id="21" name="Rectangle 20">
+            <a:extLst>
+              <a:ext uri="{FF2B5EF4-FFF2-40B4-BE49-F238E27FC236}">
+                <a16:creationId xmlns:a16="http://schemas.microsoft.com/office/drawing/2014/main" id="{7B08B568-46BE-4708-984B-1D9B3820D2E7}"/>
+              </a:ext>
+            </a:extLst>
+          </p:cNvPr>
+          <p:cNvSpPr/>
+          <p:nvPr/>
+        </p:nvSpPr>
+        <p:spPr>
+          <a:xfrm rot="16200000">
+            <a:off x="3331742" y="3530262"/>
+            <a:ext cx="711871" cy="433135"/>
+          </a:xfrm>
+          <a:prstGeom prst="rect">
+            <a:avLst/>
+          </a:prstGeom>
+          <a:solidFill>
+            <a:schemeClr val="tx1"/>
+          </a:solidFill>
+          <a:ln>
+            <a:solidFill>
+              <a:schemeClr val="tx1"/>
+            </a:solidFill>
+          </a:ln>
+        </p:spPr>
+        <p:style>
+          <a:lnRef idx="2">
+            <a:schemeClr val="accent1">
+              <a:shade val="50000"/>
+            </a:schemeClr>
+          </a:lnRef>
+          <a:fillRef idx="1">
+            <a:schemeClr val="accent1"/>
+          </a:fillRef>
+          <a:effectRef idx="0">
+            <a:schemeClr val="accent1"/>
+          </a:effectRef>
+          <a:fontRef idx="minor">
+            <a:schemeClr val="lt1"/>
+          </a:fontRef>
+        </p:style>
+        <p:txBody>
+          <a:bodyPr rtlCol="0" anchor="ctr"/>
+          <a:lstStyle/>
+          <a:p>
+            <a:pPr algn="ctr"/>
+            <a:r>
+              <a:rPr lang="en-US" sz="1400" dirty="0">
+                <a:latin typeface="Arial" panose="020B0604020202020204" pitchFamily="34" charset="0"/>
+                <a:cs typeface="Arial" panose="020B0604020202020204" pitchFamily="34" charset="0"/>
+              </a:rPr>
+              <a:t>Totals</a:t>
+            </a:r>
+          </a:p>
+        </p:txBody>
+      </p:sp>
+      <p:sp>
+        <p:nvSpPr>
+          <p:cNvPr id="22" name="Rectangle 21">
+            <a:extLst>
+              <a:ext uri="{FF2B5EF4-FFF2-40B4-BE49-F238E27FC236}">
+                <a16:creationId xmlns:a16="http://schemas.microsoft.com/office/drawing/2014/main" id="{3460708B-DF60-4C99-A56A-23519633DE41}"/>
+              </a:ext>
+            </a:extLst>
+          </p:cNvPr>
+          <p:cNvSpPr/>
+          <p:nvPr/>
+        </p:nvSpPr>
+        <p:spPr>
+          <a:xfrm>
+            <a:off x="6483009" y="385009"/>
+            <a:ext cx="711871" cy="433135"/>
+          </a:xfrm>
+          <a:prstGeom prst="rect">
+            <a:avLst/>
+          </a:prstGeom>
+          <a:solidFill>
+            <a:schemeClr val="tx1"/>
+          </a:solidFill>
+          <a:ln>
+            <a:solidFill>
+              <a:schemeClr val="tx1"/>
+            </a:solidFill>
+          </a:ln>
+        </p:spPr>
+        <p:style>
+          <a:lnRef idx="2">
+            <a:schemeClr val="accent1">
+              <a:shade val="50000"/>
+            </a:schemeClr>
+          </a:lnRef>
+          <a:fillRef idx="1">
+            <a:schemeClr val="accent1"/>
+          </a:fillRef>
+          <a:effectRef idx="0">
+            <a:schemeClr val="accent1"/>
+          </a:effectRef>
+          <a:fontRef idx="minor">
+            <a:schemeClr val="lt1"/>
+          </a:fontRef>
+        </p:style>
+        <p:txBody>
+          <a:bodyPr rtlCol="0" anchor="ctr"/>
+          <a:lstStyle/>
+          <a:p>
+            <a:pPr algn="ctr"/>
+            <a:r>
+              <a:rPr lang="en-US" sz="1400" dirty="0">
+                <a:latin typeface="Arial" panose="020B0604020202020204" pitchFamily="34" charset="0"/>
+                <a:cs typeface="Arial" panose="020B0604020202020204" pitchFamily="34" charset="0"/>
+              </a:rPr>
+              <a:t>Totals</a:t>
+            </a:r>
+          </a:p>
+        </p:txBody>
+      </p:sp>
+      <p:graphicFrame>
+        <p:nvGraphicFramePr>
+          <p:cNvPr id="23" name="Table 23">
+            <a:extLst>
+              <a:ext uri="{FF2B5EF4-FFF2-40B4-BE49-F238E27FC236}">
+                <a16:creationId xmlns:a16="http://schemas.microsoft.com/office/drawing/2014/main" id="{938EF49C-A29E-4C3A-9F46-E76315263ABA}"/>
+              </a:ext>
+            </a:extLst>
+          </p:cNvPr>
+          <p:cNvGraphicFramePr>
+            <a:graphicFrameLocks noGrp="1"/>
+          </p:cNvGraphicFramePr>
+          <p:nvPr>
+            <p:extLst>
+              <p:ext uri="{D42A27DB-BD31-4B8C-83A1-F6EECF244321}">
+                <p14:modId xmlns:p14="http://schemas.microsoft.com/office/powerpoint/2010/main" val="4249806454"/>
+              </p:ext>
+            </p:extLst>
+          </p:nvPr>
+        </p:nvGraphicFramePr>
+        <p:xfrm>
+          <a:off x="3469745" y="4164923"/>
+          <a:ext cx="3725135" cy="2189480"/>
+        </p:xfrm>
+        <a:graphic>
+          <a:graphicData uri="http://schemas.openxmlformats.org/drawingml/2006/table">
+            <a:tbl>
+              <a:tblPr firstRow="1">
+                <a:tableStyleId>{7E9639D4-E3E2-4D34-9284-5A2195B3D0D7}</a:tableStyleId>
+              </a:tblPr>
+              <a:tblGrid>
+                <a:gridCol w="1807144">
+                  <a:extLst>
+                    <a:ext uri="{9D8B030D-6E8A-4147-A177-3AD203B41FA5}">
+                      <a16:colId xmlns:a16="http://schemas.microsoft.com/office/drawing/2014/main" val="2042157408"/>
+                    </a:ext>
+                  </a:extLst>
+                </a:gridCol>
+                <a:gridCol w="1917991">
+                  <a:extLst>
+                    <a:ext uri="{9D8B030D-6E8A-4147-A177-3AD203B41FA5}">
+                      <a16:colId xmlns:a16="http://schemas.microsoft.com/office/drawing/2014/main" val="504630976"/>
+                    </a:ext>
+                  </a:extLst>
+                </a:gridCol>
+              </a:tblGrid>
+              <a:tr h="370840">
+                <a:tc>
+                  <a:txBody>
+                    <a:bodyPr/>
+                    <a:lstStyle/>
+                    <a:p>
+                      <a:pPr algn="ctr"/>
+                      <a:r>
+                        <a:rPr lang="en-US" sz="1600" dirty="0">
+                          <a:latin typeface="Arial" panose="020B0604020202020204" pitchFamily="34" charset="0"/>
+                          <a:cs typeface="Arial" panose="020B0604020202020204" pitchFamily="34" charset="0"/>
+                        </a:rPr>
+                        <a:t>Statistics</a:t>
+                      </a:r>
+                    </a:p>
+                  </a:txBody>
+                  <a:tcPr anchor="ctr">
+                    <a:lnB w="12700" cap="flat" cmpd="sng" algn="ctr">
+                      <a:solidFill>
+                        <a:schemeClr val="tx1"/>
+                      </a:solidFill>
+                      <a:prstDash val="solid"/>
+                      <a:round/>
+                      <a:headEnd type="none" w="med" len="med"/>
+                      <a:tailEnd type="none" w="med" len="med"/>
+                    </a:lnB>
+                  </a:tcPr>
+                </a:tc>
+                <a:tc>
+                  <a:txBody>
+                    <a:bodyPr/>
+                    <a:lstStyle/>
+                    <a:p>
+                      <a:r>
+                        <a:rPr lang="en-US" sz="1200" dirty="0">
+                          <a:latin typeface="Arial" panose="020B0604020202020204" pitchFamily="34" charset="0"/>
+                          <a:cs typeface="Arial" panose="020B0604020202020204" pitchFamily="34" charset="0"/>
+                        </a:rPr>
+                        <a:t>(with regards to </a:t>
+                      </a:r>
+                    </a:p>
+                    <a:p>
+                      <a:r>
+                        <a:rPr lang="en-US" sz="1200" dirty="0">
+                          <a:latin typeface="Arial" panose="020B0604020202020204" pitchFamily="34" charset="0"/>
+                          <a:cs typeface="Arial" panose="020B0604020202020204" pitchFamily="34" charset="0"/>
+                        </a:rPr>
+                        <a:t>RDT performance)</a:t>
+                      </a:r>
+                      <a:endParaRPr lang="en-US" sz="1600" dirty="0">
+                        <a:latin typeface="Arial" panose="020B0604020202020204" pitchFamily="34" charset="0"/>
+                        <a:cs typeface="Arial" panose="020B0604020202020204" pitchFamily="34" charset="0"/>
+                      </a:endParaRPr>
+                    </a:p>
+                  </a:txBody>
+                  <a:tcPr anchor="ctr">
+                    <a:lnB w="12700" cap="flat" cmpd="sng" algn="ctr">
+                      <a:solidFill>
+                        <a:schemeClr val="tx1"/>
+                      </a:solidFill>
+                      <a:prstDash val="solid"/>
+                      <a:round/>
+                      <a:headEnd type="none" w="med" len="med"/>
+                      <a:tailEnd type="none" w="med" len="med"/>
+                    </a:lnB>
+                  </a:tcPr>
+                </a:tc>
+                <a:extLst>
+                  <a:ext uri="{0D108BD9-81ED-4DB2-BD59-A6C34878D82A}">
+                    <a16:rowId xmlns:a16="http://schemas.microsoft.com/office/drawing/2014/main" val="1538450129"/>
+                  </a:ext>
+                </a:extLst>
+              </a:tr>
+              <a:tr h="370840">
+                <a:tc>
+                  <a:txBody>
+                    <a:bodyPr/>
+                    <a:lstStyle/>
+                    <a:p>
+                      <a:r>
+                        <a:rPr lang="en-US" sz="1600" dirty="0">
+                          <a:latin typeface="Arial" panose="020B0604020202020204" pitchFamily="34" charset="0"/>
+                          <a:cs typeface="Arial" panose="020B0604020202020204" pitchFamily="34" charset="0"/>
+                        </a:rPr>
+                        <a:t>Accuracy</a:t>
+                      </a:r>
+                    </a:p>
+                  </a:txBody>
+                  <a:tcPr anchor="ctr">
+                    <a:lnL w="12700" cap="flat" cmpd="sng" algn="ctr">
+                      <a:solidFill>
+                        <a:schemeClr val="tx1"/>
+                      </a:solidFill>
+                      <a:prstDash val="solid"/>
+                      <a:round/>
+                      <a:headEnd type="none" w="med" len="med"/>
+                      <a:tailEnd type="none" w="med" len="med"/>
+                    </a:lnL>
+                    <a:lnR w="12700" cap="flat" cmpd="sng" algn="ctr">
+                      <a:solidFill>
+                        <a:schemeClr val="tx1"/>
+                      </a:solidFill>
+                      <a:prstDash val="solid"/>
+                      <a:round/>
+                      <a:headEnd type="none" w="med" len="med"/>
+                      <a:tailEnd type="none" w="med" len="med"/>
+                    </a:lnR>
+                    <a:lnT w="12700" cap="flat" cmpd="sng" algn="ctr">
+                      <a:solidFill>
+                        <a:schemeClr val="tx1"/>
+                      </a:solidFill>
+                      <a:prstDash val="solid"/>
+                      <a:round/>
+                      <a:headEnd type="none" w="med" len="med"/>
+                      <a:tailEnd type="none" w="med" len="med"/>
+                    </a:lnT>
+                    <a:lnB w="12700" cap="flat" cmpd="sng" algn="ctr">
+                      <a:solidFill>
+                        <a:schemeClr val="tx1"/>
+                      </a:solidFill>
+                      <a:prstDash val="solid"/>
+                      <a:round/>
+                      <a:headEnd type="none" w="med" len="med"/>
+                      <a:tailEnd type="none" w="med" len="med"/>
+                    </a:lnB>
+                    <a:lnTlToBr w="12700" cmpd="sng">
+                      <a:noFill/>
+                      <a:prstDash val="solid"/>
+                    </a:lnTlToBr>
+                    <a:lnBlToTr w="12700" cmpd="sng">
+                      <a:noFill/>
+                      <a:prstDash val="solid"/>
+                    </a:lnBlToTr>
+                  </a:tcPr>
+                </a:tc>
+                <a:tc>
+                  <a:txBody>
+                    <a:bodyPr/>
+                    <a:lstStyle/>
+                    <a:p>
+                      <a:pPr algn="ctr"/>
+                      <a:r>
+                        <a:rPr lang="en-US" sz="1600" dirty="0">
+                          <a:latin typeface="Arial" panose="020B0604020202020204" pitchFamily="34" charset="0"/>
+                          <a:cs typeface="Arial" panose="020B0604020202020204" pitchFamily="34" charset="0"/>
+                        </a:rPr>
+                        <a:t>84%</a:t>
+                      </a:r>
+                    </a:p>
+                  </a:txBody>
+                  <a:tcPr anchor="ctr">
+                    <a:lnL w="12700" cap="flat" cmpd="sng" algn="ctr">
+                      <a:solidFill>
+                        <a:schemeClr val="tx1"/>
+                      </a:solidFill>
+                      <a:prstDash val="solid"/>
+                      <a:round/>
+                      <a:headEnd type="none" w="med" len="med"/>
+                      <a:tailEnd type="none" w="med" len="med"/>
+                    </a:lnL>
+                    <a:lnR w="12700" cap="flat" cmpd="sng" algn="ctr">
+                      <a:solidFill>
+                        <a:schemeClr val="tx1"/>
+                      </a:solidFill>
+                      <a:prstDash val="solid"/>
+                      <a:round/>
+                      <a:headEnd type="none" w="med" len="med"/>
+                      <a:tailEnd type="none" w="med" len="med"/>
+                    </a:lnR>
+                    <a:lnT w="12700" cap="flat" cmpd="sng" algn="ctr">
+                      <a:solidFill>
+                        <a:schemeClr val="tx1"/>
+                      </a:solidFill>
+                      <a:prstDash val="solid"/>
+                      <a:round/>
+                      <a:headEnd type="none" w="med" len="med"/>
+                      <a:tailEnd type="none" w="med" len="med"/>
+                    </a:lnT>
+                    <a:lnB w="12700" cap="flat" cmpd="sng" algn="ctr">
+                      <a:solidFill>
+                        <a:schemeClr val="tx1"/>
+                      </a:solidFill>
+                      <a:prstDash val="solid"/>
+                      <a:round/>
+                      <a:headEnd type="none" w="med" len="med"/>
+                      <a:tailEnd type="none" w="med" len="med"/>
+                    </a:lnB>
+                    <a:lnTlToBr w="12700" cmpd="sng">
+                      <a:noFill/>
+                      <a:prstDash val="solid"/>
+                    </a:lnTlToBr>
+                    <a:lnBlToTr w="12700" cmpd="sng">
+                      <a:noFill/>
+                      <a:prstDash val="solid"/>
+                    </a:lnBlToTr>
+                  </a:tcPr>
+                </a:tc>
+                <a:extLst>
+                  <a:ext uri="{0D108BD9-81ED-4DB2-BD59-A6C34878D82A}">
+                    <a16:rowId xmlns:a16="http://schemas.microsoft.com/office/drawing/2014/main" val="4157209075"/>
+                  </a:ext>
+                </a:extLst>
+              </a:tr>
+              <a:tr h="370840">
+                <a:tc>
+                  <a:txBody>
+                    <a:bodyPr/>
+                    <a:lstStyle/>
+                    <a:p>
+                      <a:r>
+                        <a:rPr lang="en-US" sz="1600" dirty="0">
+                          <a:latin typeface="Arial" panose="020B0604020202020204" pitchFamily="34" charset="0"/>
+                          <a:cs typeface="Arial" panose="020B0604020202020204" pitchFamily="34" charset="0"/>
+                        </a:rPr>
+                        <a:t>Sensitivity</a:t>
+                      </a:r>
+                    </a:p>
+                    <a:p>
+                      <a:r>
+                        <a:rPr lang="en-US" sz="1050" dirty="0">
+                          <a:latin typeface="Arial" panose="020B0604020202020204" pitchFamily="34" charset="0"/>
+                          <a:cs typeface="Arial" panose="020B0604020202020204" pitchFamily="34" charset="0"/>
+                        </a:rPr>
+                        <a:t>(True Positive Rate)</a:t>
+                      </a:r>
+                    </a:p>
+                  </a:txBody>
+                  <a:tcPr anchor="ctr">
+                    <a:lnL w="12700" cap="flat" cmpd="sng" algn="ctr">
+                      <a:solidFill>
+                        <a:schemeClr val="tx1"/>
+                      </a:solidFill>
+                      <a:prstDash val="solid"/>
+                      <a:round/>
+                      <a:headEnd type="none" w="med" len="med"/>
+                      <a:tailEnd type="none" w="med" len="med"/>
+                    </a:lnL>
+                    <a:lnR w="12700" cap="flat" cmpd="sng" algn="ctr">
+                      <a:solidFill>
+                        <a:schemeClr val="tx1"/>
+                      </a:solidFill>
+                      <a:prstDash val="solid"/>
+                      <a:round/>
+                      <a:headEnd type="none" w="med" len="med"/>
+                      <a:tailEnd type="none" w="med" len="med"/>
+                    </a:lnR>
+                    <a:lnT w="12700" cap="flat" cmpd="sng" algn="ctr">
+                      <a:solidFill>
+                        <a:schemeClr val="tx1"/>
+                      </a:solidFill>
+                      <a:prstDash val="solid"/>
+                      <a:round/>
+                      <a:headEnd type="none" w="med" len="med"/>
+                      <a:tailEnd type="none" w="med" len="med"/>
+                    </a:lnT>
+                    <a:lnB w="12700" cap="flat" cmpd="sng" algn="ctr">
+                      <a:solidFill>
+                        <a:schemeClr val="tx1"/>
+                      </a:solidFill>
+                      <a:prstDash val="solid"/>
+                      <a:round/>
+                      <a:headEnd type="none" w="med" len="med"/>
+                      <a:tailEnd type="none" w="med" len="med"/>
+                    </a:lnB>
+                    <a:lnTlToBr w="12700" cmpd="sng">
+                      <a:noFill/>
+                      <a:prstDash val="solid"/>
+                    </a:lnTlToBr>
+                    <a:lnBlToTr w="12700" cmpd="sng">
+                      <a:noFill/>
+                      <a:prstDash val="solid"/>
+                    </a:lnBlToTr>
+                  </a:tcPr>
+                </a:tc>
+                <a:tc>
+                  <a:txBody>
+                    <a:bodyPr/>
+                    <a:lstStyle/>
+                    <a:p>
+                      <a:pPr algn="ctr"/>
+                      <a:r>
+                        <a:rPr lang="en-US" sz="1600" dirty="0">
+                          <a:latin typeface="Arial" panose="020B0604020202020204" pitchFamily="34" charset="0"/>
+                          <a:cs typeface="Arial" panose="020B0604020202020204" pitchFamily="34" charset="0"/>
+                        </a:rPr>
+                        <a:t>83.8%</a:t>
+                      </a:r>
+                    </a:p>
+                  </a:txBody>
+                  <a:tcPr anchor="ctr">
+                    <a:lnL w="12700" cap="flat" cmpd="sng" algn="ctr">
+                      <a:solidFill>
+                        <a:schemeClr val="tx1"/>
+                      </a:solidFill>
+                      <a:prstDash val="solid"/>
+                      <a:round/>
+                      <a:headEnd type="none" w="med" len="med"/>
+                      <a:tailEnd type="none" w="med" len="med"/>
+                    </a:lnL>
+                    <a:lnR w="12700" cap="flat" cmpd="sng" algn="ctr">
+                      <a:solidFill>
+                        <a:schemeClr val="tx1"/>
+                      </a:solidFill>
+                      <a:prstDash val="solid"/>
+                      <a:round/>
+                      <a:headEnd type="none" w="med" len="med"/>
+                      <a:tailEnd type="none" w="med" len="med"/>
+                    </a:lnR>
+                    <a:lnT w="12700" cap="flat" cmpd="sng" algn="ctr">
+                      <a:solidFill>
+                        <a:schemeClr val="tx1"/>
+                      </a:solidFill>
+                      <a:prstDash val="solid"/>
+                      <a:round/>
+                      <a:headEnd type="none" w="med" len="med"/>
+                      <a:tailEnd type="none" w="med" len="med"/>
+                    </a:lnT>
+                    <a:lnB w="12700" cap="flat" cmpd="sng" algn="ctr">
+                      <a:solidFill>
+                        <a:schemeClr val="tx1"/>
+                      </a:solidFill>
+                      <a:prstDash val="solid"/>
+                      <a:round/>
+                      <a:headEnd type="none" w="med" len="med"/>
+                      <a:tailEnd type="none" w="med" len="med"/>
+                    </a:lnB>
+                    <a:lnTlToBr w="12700" cmpd="sng">
+                      <a:noFill/>
+                      <a:prstDash val="solid"/>
+                    </a:lnTlToBr>
+                    <a:lnBlToTr w="12700" cmpd="sng">
+                      <a:noFill/>
+                      <a:prstDash val="solid"/>
+                    </a:lnBlToTr>
+                  </a:tcPr>
+                </a:tc>
+                <a:extLst>
+                  <a:ext uri="{0D108BD9-81ED-4DB2-BD59-A6C34878D82A}">
+                    <a16:rowId xmlns:a16="http://schemas.microsoft.com/office/drawing/2014/main" val="2573456999"/>
+                  </a:ext>
+                </a:extLst>
+              </a:tr>
+              <a:tr h="370840">
+                <a:tc>
+                  <a:txBody>
+                    <a:bodyPr/>
+                    <a:lstStyle/>
+                    <a:p>
+                      <a:r>
+                        <a:rPr lang="en-US" sz="1600" dirty="0">
+                          <a:latin typeface="Arial" panose="020B0604020202020204" pitchFamily="34" charset="0"/>
+                          <a:cs typeface="Arial" panose="020B0604020202020204" pitchFamily="34" charset="0"/>
+                        </a:rPr>
+                        <a:t>Specificity</a:t>
+                      </a:r>
+                    </a:p>
+                    <a:p>
+                      <a:pPr marL="0" marR="0" lvl="0" indent="0" algn="l" defTabSz="914400" rtl="0" eaLnBrk="1" fontAlgn="auto" latinLnBrk="0" hangingPunct="1">
+                        <a:lnSpc>
+                          <a:spcPct val="100000"/>
+                        </a:lnSpc>
+                        <a:spcBef>
+                          <a:spcPts val="0"/>
+                        </a:spcBef>
+                        <a:spcAft>
+                          <a:spcPts val="0"/>
+                        </a:spcAft>
+                        <a:buClrTx/>
+                        <a:buSzTx/>
+                        <a:buFontTx/>
+                        <a:buNone/>
+                        <a:tabLst/>
+                        <a:defRPr/>
+                      </a:pPr>
+                      <a:r>
+                        <a:rPr kumimoji="0" lang="en-US" sz="1050" b="0" u="none" strike="noStrike" kern="1200" cap="none" spc="0" normalizeH="0" baseline="0" noProof="0" dirty="0">
+                          <a:ln>
+                            <a:noFill/>
+                          </a:ln>
+                          <a:solidFill>
+                            <a:prstClr val="black"/>
+                          </a:solidFill>
+                          <a:effectLst/>
+                          <a:uLnTx/>
+                          <a:uFillTx/>
+                          <a:latin typeface="Arial" panose="020B0604020202020204" pitchFamily="34" charset="0"/>
+                          <a:cs typeface="Arial" panose="020B0604020202020204" pitchFamily="34" charset="0"/>
+                        </a:rPr>
+                        <a:t>(True Negative Rate)</a:t>
+                      </a:r>
+                      <a:endParaRPr kumimoji="0" lang="en-US" sz="1050" b="0" i="0" u="none" strike="noStrike" kern="1200" cap="none" spc="0" normalizeH="0" baseline="0" noProof="0" dirty="0">
+                        <a:ln>
+                          <a:noFill/>
+                        </a:ln>
+                        <a:solidFill>
+                          <a:prstClr val="black"/>
+                        </a:solidFill>
+                        <a:effectLst/>
+                        <a:uLnTx/>
+                        <a:uFillTx/>
+                        <a:latin typeface="Arial" panose="020B0604020202020204" pitchFamily="34" charset="0"/>
+                        <a:ea typeface="+mn-ea"/>
+                        <a:cs typeface="Arial" panose="020B0604020202020204" pitchFamily="34" charset="0"/>
+                      </a:endParaRPr>
+                    </a:p>
+                  </a:txBody>
+                  <a:tcPr anchor="ctr">
+                    <a:lnL w="12700" cap="flat" cmpd="sng" algn="ctr">
+                      <a:solidFill>
+                        <a:schemeClr val="tx1"/>
+                      </a:solidFill>
+                      <a:prstDash val="solid"/>
+                      <a:round/>
+                      <a:headEnd type="none" w="med" len="med"/>
+                      <a:tailEnd type="none" w="med" len="med"/>
+                    </a:lnL>
+                    <a:lnR w="12700" cap="flat" cmpd="sng" algn="ctr">
+                      <a:solidFill>
+                        <a:schemeClr val="tx1"/>
+                      </a:solidFill>
+                      <a:prstDash val="solid"/>
+                      <a:round/>
+                      <a:headEnd type="none" w="med" len="med"/>
+                      <a:tailEnd type="none" w="med" len="med"/>
+                    </a:lnR>
+                    <a:lnT w="12700" cap="flat" cmpd="sng" algn="ctr">
+                      <a:solidFill>
+                        <a:schemeClr val="tx1"/>
+                      </a:solidFill>
+                      <a:prstDash val="solid"/>
+                      <a:round/>
+                      <a:headEnd type="none" w="med" len="med"/>
+                      <a:tailEnd type="none" w="med" len="med"/>
+                    </a:lnT>
+                    <a:lnB w="12700" cap="flat" cmpd="sng" algn="ctr">
+                      <a:solidFill>
+                        <a:schemeClr val="tx1"/>
+                      </a:solidFill>
+                      <a:prstDash val="solid"/>
+                      <a:round/>
+                      <a:headEnd type="none" w="med" len="med"/>
+                      <a:tailEnd type="none" w="med" len="med"/>
+                    </a:lnB>
+                    <a:lnTlToBr w="12700" cmpd="sng">
+                      <a:noFill/>
+                      <a:prstDash val="solid"/>
+                    </a:lnTlToBr>
+                    <a:lnBlToTr w="12700" cmpd="sng">
+                      <a:noFill/>
+                      <a:prstDash val="solid"/>
+                    </a:lnBlToTr>
+                  </a:tcPr>
+                </a:tc>
+                <a:tc>
+                  <a:txBody>
+                    <a:bodyPr/>
+                    <a:lstStyle/>
+                    <a:p>
+                      <a:pPr algn="ctr"/>
+                      <a:r>
+                        <a:rPr lang="en-US" sz="1600">
+                          <a:latin typeface="Arial" panose="020B0604020202020204" pitchFamily="34" charset="0"/>
+                          <a:cs typeface="Arial" panose="020B0604020202020204" pitchFamily="34" charset="0"/>
+                        </a:rPr>
+                        <a:t>84.6%</a:t>
+                      </a:r>
+                      <a:endParaRPr lang="en-US" sz="1600" dirty="0">
+                        <a:latin typeface="Arial" panose="020B0604020202020204" pitchFamily="34" charset="0"/>
+                        <a:cs typeface="Arial" panose="020B0604020202020204" pitchFamily="34" charset="0"/>
+                      </a:endParaRPr>
+                    </a:p>
+                  </a:txBody>
+                  <a:tcPr anchor="ctr">
+                    <a:lnL w="12700" cap="flat" cmpd="sng" algn="ctr">
+                      <a:solidFill>
+                        <a:schemeClr val="tx1"/>
+                      </a:solidFill>
+                      <a:prstDash val="solid"/>
+                      <a:round/>
+                      <a:headEnd type="none" w="med" len="med"/>
+                      <a:tailEnd type="none" w="med" len="med"/>
+                    </a:lnL>
+                    <a:lnR w="12700" cap="flat" cmpd="sng" algn="ctr">
+                      <a:solidFill>
+                        <a:schemeClr val="tx1"/>
+                      </a:solidFill>
+                      <a:prstDash val="solid"/>
+                      <a:round/>
+                      <a:headEnd type="none" w="med" len="med"/>
+                      <a:tailEnd type="none" w="med" len="med"/>
+                    </a:lnR>
+                    <a:lnT w="12700" cap="flat" cmpd="sng" algn="ctr">
+                      <a:solidFill>
+                        <a:schemeClr val="tx1"/>
+                      </a:solidFill>
+                      <a:prstDash val="solid"/>
+                      <a:round/>
+                      <a:headEnd type="none" w="med" len="med"/>
+                      <a:tailEnd type="none" w="med" len="med"/>
+                    </a:lnT>
+                    <a:lnB w="12700" cap="flat" cmpd="sng" algn="ctr">
+                      <a:solidFill>
+                        <a:schemeClr val="tx1"/>
+                      </a:solidFill>
+                      <a:prstDash val="solid"/>
+                      <a:round/>
+                      <a:headEnd type="none" w="med" len="med"/>
+                      <a:tailEnd type="none" w="med" len="med"/>
+                    </a:lnB>
+                    <a:lnTlToBr w="12700" cmpd="sng">
+                      <a:noFill/>
+                      <a:prstDash val="solid"/>
+                    </a:lnTlToBr>
+                    <a:lnBlToTr w="12700" cmpd="sng">
+                      <a:noFill/>
+                      <a:prstDash val="solid"/>
+                    </a:lnBlToTr>
+                  </a:tcPr>
+                </a:tc>
+                <a:extLst>
+                  <a:ext uri="{0D108BD9-81ED-4DB2-BD59-A6C34878D82A}">
+                    <a16:rowId xmlns:a16="http://schemas.microsoft.com/office/drawing/2014/main" val="1092511420"/>
+                  </a:ext>
+                </a:extLst>
+              </a:tr>
+              <a:tr h="370840">
+                <a:tc>
+                  <a:txBody>
+                    <a:bodyPr/>
+                    <a:lstStyle/>
+                    <a:p>
+                      <a:pPr marL="0" marR="0" lvl="0" indent="0" algn="l" defTabSz="914400" rtl="0" eaLnBrk="1" fontAlgn="auto" latinLnBrk="0" hangingPunct="1">
+                        <a:lnSpc>
+                          <a:spcPct val="100000"/>
+                        </a:lnSpc>
+                        <a:spcBef>
+                          <a:spcPts val="0"/>
+                        </a:spcBef>
+                        <a:spcAft>
+                          <a:spcPts val="0"/>
+                        </a:spcAft>
+                        <a:buClrTx/>
+                        <a:buSzTx/>
+                        <a:buFontTx/>
+                        <a:buNone/>
+                        <a:tabLst/>
+                        <a:defRPr/>
+                      </a:pPr>
+                      <a:r>
+                        <a:rPr kumimoji="0" lang="en-US" sz="1600" b="0" u="none" strike="noStrike" kern="1200" cap="none" spc="0" normalizeH="0" baseline="0" noProof="0" dirty="0">
+                          <a:ln>
+                            <a:noFill/>
+                          </a:ln>
+                          <a:solidFill>
+                            <a:prstClr val="black"/>
+                          </a:solidFill>
+                          <a:effectLst/>
+                          <a:uLnTx/>
+                          <a:uFillTx/>
+                          <a:latin typeface="Arial" panose="020B0604020202020204" pitchFamily="34" charset="0"/>
+                          <a:cs typeface="Arial" panose="020B0604020202020204" pitchFamily="34" charset="0"/>
+                        </a:rPr>
+                        <a:t>F</a:t>
+                      </a:r>
+                      <a:r>
+                        <a:rPr kumimoji="0" lang="en-US" sz="1600" b="0" u="none" strike="noStrike" kern="1200" cap="none" spc="0" normalizeH="0" baseline="-25000" noProof="0" dirty="0">
+                          <a:ln>
+                            <a:noFill/>
+                          </a:ln>
+                          <a:solidFill>
+                            <a:prstClr val="black"/>
+                          </a:solidFill>
+                          <a:effectLst/>
+                          <a:uLnTx/>
+                          <a:uFillTx/>
+                          <a:latin typeface="Arial" panose="020B0604020202020204" pitchFamily="34" charset="0"/>
+                          <a:cs typeface="Arial" panose="020B0604020202020204" pitchFamily="34" charset="0"/>
+                        </a:rPr>
+                        <a:t>1</a:t>
+                      </a:r>
+                      <a:r>
+                        <a:rPr kumimoji="0" lang="en-US" sz="1600" b="0" u="none" strike="noStrike" kern="1200" cap="none" spc="0" normalizeH="0" baseline="0" noProof="0" dirty="0">
+                          <a:ln>
+                            <a:noFill/>
+                          </a:ln>
+                          <a:solidFill>
+                            <a:prstClr val="black"/>
+                          </a:solidFill>
+                          <a:effectLst/>
+                          <a:uLnTx/>
+                          <a:uFillTx/>
+                          <a:latin typeface="Arial" panose="020B0604020202020204" pitchFamily="34" charset="0"/>
+                          <a:cs typeface="Arial" panose="020B0604020202020204" pitchFamily="34" charset="0"/>
+                        </a:rPr>
+                        <a:t> Score</a:t>
+                      </a:r>
+                      <a:endParaRPr kumimoji="0" lang="en-US" sz="1600" b="0" i="0" u="none" strike="noStrike" kern="1200" cap="none" spc="0" normalizeH="0" baseline="0" noProof="0" dirty="0">
+                        <a:ln>
+                          <a:noFill/>
+                        </a:ln>
+                        <a:solidFill>
+                          <a:prstClr val="black"/>
+                        </a:solidFill>
+                        <a:effectLst/>
+                        <a:uLnTx/>
+                        <a:uFillTx/>
+                        <a:latin typeface="Arial" panose="020B0604020202020204" pitchFamily="34" charset="0"/>
+                        <a:ea typeface="+mn-ea"/>
+                        <a:cs typeface="Arial" panose="020B0604020202020204" pitchFamily="34" charset="0"/>
+                      </a:endParaRPr>
+                    </a:p>
+                  </a:txBody>
+                  <a:tcPr anchor="ctr">
+                    <a:lnL w="12700" cap="flat" cmpd="sng" algn="ctr">
+                      <a:solidFill>
+                        <a:schemeClr val="tx1"/>
+                      </a:solidFill>
+                      <a:prstDash val="solid"/>
+                      <a:round/>
+                      <a:headEnd type="none" w="med" len="med"/>
+                      <a:tailEnd type="none" w="med" len="med"/>
+                    </a:lnL>
+                    <a:lnR w="12700" cap="flat" cmpd="sng" algn="ctr">
+                      <a:solidFill>
+                        <a:schemeClr val="tx1"/>
+                      </a:solidFill>
+                      <a:prstDash val="solid"/>
+                      <a:round/>
+                      <a:headEnd type="none" w="med" len="med"/>
+                      <a:tailEnd type="none" w="med" len="med"/>
+                    </a:lnR>
+                    <a:lnT w="12700" cap="flat" cmpd="sng" algn="ctr">
+                      <a:solidFill>
+                        <a:schemeClr val="tx1"/>
+                      </a:solidFill>
+                      <a:prstDash val="solid"/>
+                      <a:round/>
+                      <a:headEnd type="none" w="med" len="med"/>
+                      <a:tailEnd type="none" w="med" len="med"/>
+                    </a:lnT>
+                    <a:lnB w="12700" cap="flat" cmpd="sng" algn="ctr">
+                      <a:solidFill>
+                        <a:schemeClr val="tx1"/>
+                      </a:solidFill>
+                      <a:prstDash val="solid"/>
+                      <a:round/>
+                      <a:headEnd type="none" w="med" len="med"/>
+                      <a:tailEnd type="none" w="med" len="med"/>
+                    </a:lnB>
+                    <a:lnTlToBr w="12700" cmpd="sng">
+                      <a:noFill/>
+                      <a:prstDash val="solid"/>
+                    </a:lnTlToBr>
+                    <a:lnBlToTr w="12700" cmpd="sng">
+                      <a:noFill/>
+                      <a:prstDash val="solid"/>
+                    </a:lnBlToTr>
+                  </a:tcPr>
+                </a:tc>
+                <a:tc>
+                  <a:txBody>
+                    <a:bodyPr/>
+                    <a:lstStyle/>
+                    <a:p>
+                      <a:pPr algn="ctr"/>
+                      <a:r>
+                        <a:rPr lang="en-US" sz="1600" dirty="0">
+                          <a:latin typeface="Arial" panose="020B0604020202020204" pitchFamily="34" charset="0"/>
+                          <a:cs typeface="Arial" panose="020B0604020202020204" pitchFamily="34" charset="0"/>
+                        </a:rPr>
+                        <a:t>88.6%</a:t>
+                      </a:r>
+                    </a:p>
+                  </a:txBody>
+                  <a:tcPr anchor="ctr">
+                    <a:lnL w="12700" cap="flat" cmpd="sng" algn="ctr">
+                      <a:solidFill>
+                        <a:schemeClr val="tx1"/>
+                      </a:solidFill>
+                      <a:prstDash val="solid"/>
+                      <a:round/>
+                      <a:headEnd type="none" w="med" len="med"/>
+                      <a:tailEnd type="none" w="med" len="med"/>
+                    </a:lnL>
+                    <a:lnR w="12700" cap="flat" cmpd="sng" algn="ctr">
+                      <a:solidFill>
+                        <a:schemeClr val="tx1"/>
+                      </a:solidFill>
+                      <a:prstDash val="solid"/>
+                      <a:round/>
+                      <a:headEnd type="none" w="med" len="med"/>
+                      <a:tailEnd type="none" w="med" len="med"/>
+                    </a:lnR>
+                    <a:lnT w="12700" cap="flat" cmpd="sng" algn="ctr">
+                      <a:solidFill>
+                        <a:schemeClr val="tx1"/>
+                      </a:solidFill>
+                      <a:prstDash val="solid"/>
+                      <a:round/>
+                      <a:headEnd type="none" w="med" len="med"/>
+                      <a:tailEnd type="none" w="med" len="med"/>
+                    </a:lnT>
+                    <a:lnB w="12700" cap="flat" cmpd="sng" algn="ctr">
+                      <a:solidFill>
+                        <a:schemeClr val="tx1"/>
+                      </a:solidFill>
+                      <a:prstDash val="solid"/>
+                      <a:round/>
+                      <a:headEnd type="none" w="med" len="med"/>
+                      <a:tailEnd type="none" w="med" len="med"/>
+                    </a:lnB>
+                    <a:lnTlToBr w="12700" cmpd="sng">
+                      <a:noFill/>
+                      <a:prstDash val="solid"/>
+                    </a:lnTlToBr>
+                    <a:lnBlToTr w="12700" cmpd="sng">
+                      <a:noFill/>
+                      <a:prstDash val="solid"/>
+                    </a:lnBlToTr>
+                  </a:tcPr>
+                </a:tc>
+                <a:extLst>
+                  <a:ext uri="{0D108BD9-81ED-4DB2-BD59-A6C34878D82A}">
+                    <a16:rowId xmlns:a16="http://schemas.microsoft.com/office/drawing/2014/main" val="4114089788"/>
+                  </a:ext>
+                </a:extLst>
+              </a:tr>
+            </a:tbl>
+          </a:graphicData>
+        </a:graphic>
+      </p:graphicFrame>
+    </p:spTree>
+    <p:extLst>
+      <p:ext uri="{BB962C8B-B14F-4D97-AF65-F5344CB8AC3E}">
+        <p14:creationId xmlns:p14="http://schemas.microsoft.com/office/powerpoint/2010/main" val="3033396599"/>
+      </p:ext>
+    </p:extLst>
+  </p:cSld>
+  <p:clrMapOvr>
+    <a:masterClrMapping/>
+  </p:clrMapOvr>
+</p:sld>
+</file>
+
 <file path=ppt/theme/theme1.xml><?xml version="1.0" encoding="utf-8"?>
 <a:theme xmlns:a="http://schemas.openxmlformats.org/drawingml/2006/main" name="Office Theme">
   <a:themeElements>

</xml_diff>